<commit_message>
ERK kernel matrix, kernel-main-green
</commit_message>
<xml_diff>
--- a/Articles/ERK/schemes.pptx
+++ b/Articles/ERK/schemes.pptx
@@ -3585,8 +3585,7 @@
             <a:avLst/>
           </a:prstGeom>
           <a:solidFill>
-            <a:schemeClr val="accent1">
-              <a:lumMod val="75000"/>
+            <a:schemeClr val="accent6">
               <a:alpha val="20000"/>
             </a:schemeClr>
           </a:solidFill>
@@ -3678,8 +3677,7 @@
             <a:avLst/>
           </a:prstGeom>
           <a:solidFill>
-            <a:schemeClr val="accent1">
-              <a:lumMod val="75000"/>
+            <a:schemeClr val="accent6">
               <a:alpha val="40000"/>
             </a:schemeClr>
           </a:solidFill>
@@ -3771,8 +3769,7 @@
             <a:avLst/>
           </a:prstGeom>
           <a:solidFill>
-            <a:schemeClr val="accent1">
-              <a:lumMod val="75000"/>
+            <a:schemeClr val="accent6">
               <a:alpha val="60000"/>
             </a:schemeClr>
           </a:solidFill>
@@ -3864,8 +3861,7 @@
             <a:avLst/>
           </a:prstGeom>
           <a:solidFill>
-            <a:schemeClr val="accent1">
-              <a:lumMod val="75000"/>
+            <a:schemeClr val="accent6">
               <a:alpha val="75000"/>
             </a:schemeClr>
           </a:solidFill>
@@ -3957,8 +3953,7 @@
             <a:avLst/>
           </a:prstGeom>
           <a:solidFill>
-            <a:schemeClr val="accent1">
-              <a:lumMod val="75000"/>
+            <a:schemeClr val="accent6">
               <a:alpha val="60000"/>
             </a:schemeClr>
           </a:solidFill>
@@ -4050,8 +4045,7 @@
             <a:avLst/>
           </a:prstGeom>
           <a:solidFill>
-            <a:schemeClr val="accent1">
-              <a:lumMod val="75000"/>
+            <a:schemeClr val="accent6">
               <a:alpha val="40000"/>
             </a:schemeClr>
           </a:solidFill>
@@ -4143,8 +4137,7 @@
             <a:avLst/>
           </a:prstGeom>
           <a:solidFill>
-            <a:schemeClr val="accent1">
-              <a:lumMod val="75000"/>
+            <a:schemeClr val="accent6">
               <a:alpha val="20000"/>
             </a:schemeClr>
           </a:solidFill>
@@ -4325,10 +4318,10 @@
       </p:grpSpPr>
       <p:sp>
         <p:nvSpPr>
-          <p:cNvPr id="2" name="Rectangle 1">
-            <a:extLst>
-              <a:ext uri="{FF2B5EF4-FFF2-40B4-BE49-F238E27FC236}">
-                <a16:creationId xmlns:a16="http://schemas.microsoft.com/office/drawing/2014/main" id="{C62ED0E5-CFE1-BD8E-BC2D-9EFD1D256BCA}"/>
+          <p:cNvPr id="53" name="Rectangle 1">
+            <a:extLst>
+              <a:ext uri="{FF2B5EF4-FFF2-40B4-BE49-F238E27FC236}">
+                <a16:creationId xmlns:a16="http://schemas.microsoft.com/office/drawing/2014/main" id="{C70BAE44-332A-EF81-C35C-C45E339562E1}"/>
               </a:ext>
             </a:extLst>
           </p:cNvPr>
@@ -4339,7 +4332,7 @@
         </p:nvSpPr>
         <p:spPr>
           <a:xfrm>
-            <a:off x="2578100" y="1930400"/>
+            <a:off x="610120" y="1685073"/>
             <a:ext cx="1800000" cy="1800000"/>
           </a:xfrm>
           <a:prstGeom prst="rect">
@@ -4381,10 +4374,10 @@
       </p:sp>
       <p:sp>
         <p:nvSpPr>
-          <p:cNvPr id="4" name="Rectangle 3">
-            <a:extLst>
-              <a:ext uri="{FF2B5EF4-FFF2-40B4-BE49-F238E27FC236}">
-                <a16:creationId xmlns:a16="http://schemas.microsoft.com/office/drawing/2014/main" id="{106F8172-FD52-B40F-A8A6-C9CE8419AB9E}"/>
+          <p:cNvPr id="54" name="Rectangle 3">
+            <a:extLst>
+              <a:ext uri="{FF2B5EF4-FFF2-40B4-BE49-F238E27FC236}">
+                <a16:creationId xmlns:a16="http://schemas.microsoft.com/office/drawing/2014/main" id="{D6CA3D50-7A0C-539B-2B69-DA3F51F3FB66}"/>
               </a:ext>
             </a:extLst>
           </p:cNvPr>
@@ -4395,7 +4388,7 @@
         </p:nvSpPr>
         <p:spPr>
           <a:xfrm>
-            <a:off x="2578100" y="1930400"/>
+            <a:off x="610120" y="1685073"/>
             <a:ext cx="360000" cy="360000"/>
           </a:xfrm>
           <a:prstGeom prst="rect">
@@ -4439,10 +4432,10 @@
       </p:sp>
       <p:sp>
         <p:nvSpPr>
-          <p:cNvPr id="11" name="Rectangle 10">
-            <a:extLst>
-              <a:ext uri="{FF2B5EF4-FFF2-40B4-BE49-F238E27FC236}">
-                <a16:creationId xmlns:a16="http://schemas.microsoft.com/office/drawing/2014/main" id="{C8B3EE9D-2A37-357F-1671-126F3622A250}"/>
+          <p:cNvPr id="55" name="Rectangle 10">
+            <a:extLst>
+              <a:ext uri="{FF2B5EF4-FFF2-40B4-BE49-F238E27FC236}">
+                <a16:creationId xmlns:a16="http://schemas.microsoft.com/office/drawing/2014/main" id="{856F2DE0-D3C8-857F-4EBE-0E1666C2EEBB}"/>
               </a:ext>
             </a:extLst>
           </p:cNvPr>
@@ -4453,7 +4446,7 @@
         </p:nvSpPr>
         <p:spPr>
           <a:xfrm>
-            <a:off x="2578100" y="2290400"/>
+            <a:off x="610120" y="2045073"/>
             <a:ext cx="360000" cy="360000"/>
           </a:xfrm>
           <a:prstGeom prst="rect">
@@ -4497,10 +4490,10 @@
       </p:sp>
       <p:sp>
         <p:nvSpPr>
-          <p:cNvPr id="12" name="Rectangle 11">
-            <a:extLst>
-              <a:ext uri="{FF2B5EF4-FFF2-40B4-BE49-F238E27FC236}">
-                <a16:creationId xmlns:a16="http://schemas.microsoft.com/office/drawing/2014/main" id="{5D47C5BB-216D-5736-373E-ABB640327678}"/>
+          <p:cNvPr id="56" name="Rectangle 11">
+            <a:extLst>
+              <a:ext uri="{FF2B5EF4-FFF2-40B4-BE49-F238E27FC236}">
+                <a16:creationId xmlns:a16="http://schemas.microsoft.com/office/drawing/2014/main" id="{3991DD22-BE31-34D5-EC5D-01980C73B66D}"/>
               </a:ext>
             </a:extLst>
           </p:cNvPr>
@@ -4511,7 +4504,7 @@
         </p:nvSpPr>
         <p:spPr>
           <a:xfrm>
-            <a:off x="2578100" y="2650400"/>
+            <a:off x="610120" y="2405073"/>
             <a:ext cx="360000" cy="360000"/>
           </a:xfrm>
           <a:prstGeom prst="rect">
@@ -4555,10 +4548,10 @@
       </p:sp>
       <p:sp>
         <p:nvSpPr>
-          <p:cNvPr id="13" name="Rectangle 12">
-            <a:extLst>
-              <a:ext uri="{FF2B5EF4-FFF2-40B4-BE49-F238E27FC236}">
-                <a16:creationId xmlns:a16="http://schemas.microsoft.com/office/drawing/2014/main" id="{C813F7DC-8811-B57F-A554-7C1A6E9BC3B9}"/>
+          <p:cNvPr id="57" name="Rectangle 12">
+            <a:extLst>
+              <a:ext uri="{FF2B5EF4-FFF2-40B4-BE49-F238E27FC236}">
+                <a16:creationId xmlns:a16="http://schemas.microsoft.com/office/drawing/2014/main" id="{3F304470-2EFA-46ED-A26E-EDA279D9CED5}"/>
               </a:ext>
             </a:extLst>
           </p:cNvPr>
@@ -4569,7 +4562,7 @@
         </p:nvSpPr>
         <p:spPr>
           <a:xfrm>
-            <a:off x="2578100" y="3010400"/>
+            <a:off x="610120" y="2765073"/>
             <a:ext cx="360000" cy="360000"/>
           </a:xfrm>
           <a:prstGeom prst="rect">
@@ -4613,10 +4606,10 @@
       </p:sp>
       <p:sp>
         <p:nvSpPr>
-          <p:cNvPr id="14" name="Rectangle 13">
-            <a:extLst>
-              <a:ext uri="{FF2B5EF4-FFF2-40B4-BE49-F238E27FC236}">
-                <a16:creationId xmlns:a16="http://schemas.microsoft.com/office/drawing/2014/main" id="{CF400037-A756-02A8-E7B1-A9CD51A0956E}"/>
+          <p:cNvPr id="58" name="Rectangle 13">
+            <a:extLst>
+              <a:ext uri="{FF2B5EF4-FFF2-40B4-BE49-F238E27FC236}">
+                <a16:creationId xmlns:a16="http://schemas.microsoft.com/office/drawing/2014/main" id="{054BD6D2-536D-7A0E-E682-DDDA89D4874D}"/>
               </a:ext>
             </a:extLst>
           </p:cNvPr>
@@ -4627,7 +4620,7 @@
         </p:nvSpPr>
         <p:spPr>
           <a:xfrm>
-            <a:off x="2578100" y="3370400"/>
+            <a:off x="610120" y="3125073"/>
             <a:ext cx="360000" cy="360000"/>
           </a:xfrm>
           <a:prstGeom prst="rect">
@@ -4671,10 +4664,10 @@
       </p:sp>
       <p:sp>
         <p:nvSpPr>
-          <p:cNvPr id="15" name="Rectangle 14">
-            <a:extLst>
-              <a:ext uri="{FF2B5EF4-FFF2-40B4-BE49-F238E27FC236}">
-                <a16:creationId xmlns:a16="http://schemas.microsoft.com/office/drawing/2014/main" id="{DDCB0C0F-8ACA-0987-C1D6-6CA033B7DAD7}"/>
+          <p:cNvPr id="59" name="Rectangle 14">
+            <a:extLst>
+              <a:ext uri="{FF2B5EF4-FFF2-40B4-BE49-F238E27FC236}">
+                <a16:creationId xmlns:a16="http://schemas.microsoft.com/office/drawing/2014/main" id="{96A3CE63-EE52-5134-E8D5-124BEF8511CA}"/>
               </a:ext>
             </a:extLst>
           </p:cNvPr>
@@ -4685,7 +4678,7 @@
         </p:nvSpPr>
         <p:spPr>
           <a:xfrm>
-            <a:off x="2942500" y="1930400"/>
+            <a:off x="974520" y="1685073"/>
             <a:ext cx="360000" cy="360000"/>
           </a:xfrm>
           <a:prstGeom prst="rect">
@@ -4729,10 +4722,10 @@
       </p:sp>
       <p:sp>
         <p:nvSpPr>
-          <p:cNvPr id="16" name="Rectangle 15">
-            <a:extLst>
-              <a:ext uri="{FF2B5EF4-FFF2-40B4-BE49-F238E27FC236}">
-                <a16:creationId xmlns:a16="http://schemas.microsoft.com/office/drawing/2014/main" id="{9107CDD4-A150-3093-D330-70AA74E1F378}"/>
+          <p:cNvPr id="60" name="Rectangle 15">
+            <a:extLst>
+              <a:ext uri="{FF2B5EF4-FFF2-40B4-BE49-F238E27FC236}">
+                <a16:creationId xmlns:a16="http://schemas.microsoft.com/office/drawing/2014/main" id="{FB9CF588-BAF3-0511-B00B-8C558B1BABAB}"/>
               </a:ext>
             </a:extLst>
           </p:cNvPr>
@@ -4743,7 +4736,7 @@
         </p:nvSpPr>
         <p:spPr>
           <a:xfrm>
-            <a:off x="2942500" y="2289040"/>
+            <a:off x="974520" y="2043713"/>
             <a:ext cx="360000" cy="360000"/>
           </a:xfrm>
           <a:prstGeom prst="rect">
@@ -4787,10 +4780,10 @@
       </p:sp>
       <p:sp>
         <p:nvSpPr>
-          <p:cNvPr id="3" name="Rectangle 10">
-            <a:extLst>
-              <a:ext uri="{FF2B5EF4-FFF2-40B4-BE49-F238E27FC236}">
-                <a16:creationId xmlns:a16="http://schemas.microsoft.com/office/drawing/2014/main" id="{B31C93F1-50AD-A15E-D646-A82120503291}"/>
+          <p:cNvPr id="61" name="Rectangle 10">
+            <a:extLst>
+              <a:ext uri="{FF2B5EF4-FFF2-40B4-BE49-F238E27FC236}">
+                <a16:creationId xmlns:a16="http://schemas.microsoft.com/office/drawing/2014/main" id="{43C7462E-5FAD-C196-5A29-BA7CAD1A4878}"/>
               </a:ext>
             </a:extLst>
           </p:cNvPr>
@@ -4801,7 +4794,7 @@
         </p:nvSpPr>
         <p:spPr>
           <a:xfrm>
-            <a:off x="2942500" y="2647680"/>
+            <a:off x="974520" y="2402353"/>
             <a:ext cx="360000" cy="360000"/>
           </a:xfrm>
           <a:prstGeom prst="rect">
@@ -4809,7 +4802,7 @@
           </a:prstGeom>
           <a:solidFill>
             <a:schemeClr val="accent1">
-              <a:alpha val="60000"/>
+              <a:alpha val="75000"/>
             </a:schemeClr>
           </a:solidFill>
           <a:ln w="19050">
@@ -4845,10 +4838,10 @@
       </p:sp>
       <p:sp>
         <p:nvSpPr>
-          <p:cNvPr id="5" name="Rectangle 11">
-            <a:extLst>
-              <a:ext uri="{FF2B5EF4-FFF2-40B4-BE49-F238E27FC236}">
-                <a16:creationId xmlns:a16="http://schemas.microsoft.com/office/drawing/2014/main" id="{81938A76-7038-DD87-21E5-3BF82FB26CF7}"/>
+          <p:cNvPr id="62" name="Rectangle 11">
+            <a:extLst>
+              <a:ext uri="{FF2B5EF4-FFF2-40B4-BE49-F238E27FC236}">
+                <a16:creationId xmlns:a16="http://schemas.microsoft.com/office/drawing/2014/main" id="{7DF2E758-E2DA-C6D8-10C0-A690B2A5B1F2}"/>
               </a:ext>
             </a:extLst>
           </p:cNvPr>
@@ -4859,7 +4852,7 @@
         </p:nvSpPr>
         <p:spPr>
           <a:xfrm>
-            <a:off x="2942500" y="3007680"/>
+            <a:off x="974520" y="2762353"/>
             <a:ext cx="360000" cy="360000"/>
           </a:xfrm>
           <a:prstGeom prst="rect">
@@ -4903,10 +4896,10 @@
       </p:sp>
       <p:sp>
         <p:nvSpPr>
-          <p:cNvPr id="6" name="Rectangle 12">
-            <a:extLst>
-              <a:ext uri="{FF2B5EF4-FFF2-40B4-BE49-F238E27FC236}">
-                <a16:creationId xmlns:a16="http://schemas.microsoft.com/office/drawing/2014/main" id="{257D6A37-687F-65A0-24E6-AFA8F96B3A15}"/>
+          <p:cNvPr id="63" name="Rectangle 12">
+            <a:extLst>
+              <a:ext uri="{FF2B5EF4-FFF2-40B4-BE49-F238E27FC236}">
+                <a16:creationId xmlns:a16="http://schemas.microsoft.com/office/drawing/2014/main" id="{5E959002-BF7F-BA47-E93C-4E03B0504010}"/>
               </a:ext>
             </a:extLst>
           </p:cNvPr>
@@ -4917,7 +4910,7 @@
         </p:nvSpPr>
         <p:spPr>
           <a:xfrm>
-            <a:off x="2942500" y="3367680"/>
+            <a:off x="974520" y="3122353"/>
             <a:ext cx="360000" cy="360000"/>
           </a:xfrm>
           <a:prstGeom prst="rect">
@@ -4961,10 +4954,10 @@
       </p:sp>
       <p:sp>
         <p:nvSpPr>
-          <p:cNvPr id="10" name="Rectangle 3">
-            <a:extLst>
-              <a:ext uri="{FF2B5EF4-FFF2-40B4-BE49-F238E27FC236}">
-                <a16:creationId xmlns:a16="http://schemas.microsoft.com/office/drawing/2014/main" id="{C09AACC7-DEEA-1213-3FA8-049B4A94DC04}"/>
+          <p:cNvPr id="64" name="Rectangle 3">
+            <a:extLst>
+              <a:ext uri="{FF2B5EF4-FFF2-40B4-BE49-F238E27FC236}">
+                <a16:creationId xmlns:a16="http://schemas.microsoft.com/office/drawing/2014/main" id="{35AD8426-BA3E-8632-978A-D8710FB2067F}"/>
               </a:ext>
             </a:extLst>
           </p:cNvPr>
@@ -4975,7 +4968,7 @@
         </p:nvSpPr>
         <p:spPr>
           <a:xfrm>
-            <a:off x="3302500" y="1929040"/>
+            <a:off x="1334520" y="1683713"/>
             <a:ext cx="360000" cy="360000"/>
           </a:xfrm>
           <a:prstGeom prst="rect">
@@ -5019,10 +5012,10 @@
       </p:sp>
       <p:sp>
         <p:nvSpPr>
-          <p:cNvPr id="17" name="Rectangle 10">
-            <a:extLst>
-              <a:ext uri="{FF2B5EF4-FFF2-40B4-BE49-F238E27FC236}">
-                <a16:creationId xmlns:a16="http://schemas.microsoft.com/office/drawing/2014/main" id="{A1DBB292-168A-8B7D-1263-43F93D8CCAA3}"/>
+          <p:cNvPr id="65" name="Rectangle 10">
+            <a:extLst>
+              <a:ext uri="{FF2B5EF4-FFF2-40B4-BE49-F238E27FC236}">
+                <a16:creationId xmlns:a16="http://schemas.microsoft.com/office/drawing/2014/main" id="{BB080EFC-4773-ECEA-7401-871D6A68F9DE}"/>
               </a:ext>
             </a:extLst>
           </p:cNvPr>
@@ -5033,7 +5026,7 @@
         </p:nvSpPr>
         <p:spPr>
           <a:xfrm>
-            <a:off x="3302500" y="2289040"/>
+            <a:off x="1334520" y="2043713"/>
             <a:ext cx="360000" cy="360000"/>
           </a:xfrm>
           <a:prstGeom prst="rect">
@@ -5041,7 +5034,7 @@
           </a:prstGeom>
           <a:solidFill>
             <a:schemeClr val="accent1">
-              <a:alpha val="60000"/>
+              <a:alpha val="75000"/>
             </a:schemeClr>
           </a:solidFill>
           <a:ln w="19050">
@@ -5077,10 +5070,10 @@
       </p:sp>
       <p:sp>
         <p:nvSpPr>
-          <p:cNvPr id="18" name="Rectangle 11">
-            <a:extLst>
-              <a:ext uri="{FF2B5EF4-FFF2-40B4-BE49-F238E27FC236}">
-                <a16:creationId xmlns:a16="http://schemas.microsoft.com/office/drawing/2014/main" id="{10D3CABE-9F94-B063-4886-E23EE418E8EC}"/>
+          <p:cNvPr id="66" name="Rectangle 11">
+            <a:extLst>
+              <a:ext uri="{FF2B5EF4-FFF2-40B4-BE49-F238E27FC236}">
+                <a16:creationId xmlns:a16="http://schemas.microsoft.com/office/drawing/2014/main" id="{29900959-070B-284A-E842-D12C6BBC2062}"/>
               </a:ext>
             </a:extLst>
           </p:cNvPr>
@@ -5091,17 +5084,14 @@
         </p:nvSpPr>
         <p:spPr>
           <a:xfrm>
-            <a:off x="3302500" y="2650400"/>
+            <a:off x="1334520" y="2405073"/>
             <a:ext cx="360000" cy="360000"/>
           </a:xfrm>
           <a:prstGeom prst="rect">
             <a:avLst/>
           </a:prstGeom>
           <a:solidFill>
-            <a:schemeClr val="accent1">
-              <a:lumMod val="75000"/>
-              <a:alpha val="75000"/>
-            </a:schemeClr>
+            <a:schemeClr val="accent4"/>
           </a:solidFill>
           <a:ln w="19050">
             <a:solidFill>
@@ -5136,10 +5126,10 @@
       </p:sp>
       <p:sp>
         <p:nvSpPr>
-          <p:cNvPr id="19" name="Rectangle 12">
-            <a:extLst>
-              <a:ext uri="{FF2B5EF4-FFF2-40B4-BE49-F238E27FC236}">
-                <a16:creationId xmlns:a16="http://schemas.microsoft.com/office/drawing/2014/main" id="{109BE6C4-A325-9788-34AF-3A2C7759A290}"/>
+          <p:cNvPr id="67" name="Rectangle 12">
+            <a:extLst>
+              <a:ext uri="{FF2B5EF4-FFF2-40B4-BE49-F238E27FC236}">
+                <a16:creationId xmlns:a16="http://schemas.microsoft.com/office/drawing/2014/main" id="{0E5597E9-2E9F-277B-0C80-D7C7812FAB85}"/>
               </a:ext>
             </a:extLst>
           </p:cNvPr>
@@ -5150,15 +5140,15 @@
         </p:nvSpPr>
         <p:spPr>
           <a:xfrm>
-            <a:off x="3302500" y="3009040"/>
+            <a:off x="1334520" y="2763713"/>
             <a:ext cx="360000" cy="360000"/>
           </a:xfrm>
           <a:prstGeom prst="rect">
             <a:avLst/>
           </a:prstGeom>
           <a:solidFill>
-            <a:schemeClr val="accent1">
-              <a:alpha val="60000"/>
+            <a:schemeClr val="accent4">
+              <a:alpha val="75000"/>
             </a:schemeClr>
           </a:solidFill>
           <a:ln w="19050">
@@ -5194,10 +5184,10 @@
       </p:sp>
       <p:sp>
         <p:nvSpPr>
-          <p:cNvPr id="20" name="Rectangle 13">
-            <a:extLst>
-              <a:ext uri="{FF2B5EF4-FFF2-40B4-BE49-F238E27FC236}">
-                <a16:creationId xmlns:a16="http://schemas.microsoft.com/office/drawing/2014/main" id="{B864A49C-1F9E-A7AA-8520-6DBF8919C54A}"/>
+          <p:cNvPr id="68" name="Rectangle 13">
+            <a:extLst>
+              <a:ext uri="{FF2B5EF4-FFF2-40B4-BE49-F238E27FC236}">
+                <a16:creationId xmlns:a16="http://schemas.microsoft.com/office/drawing/2014/main" id="{D4F37B59-A8BD-8E91-BF4A-03E3EB7A5FA1}"/>
               </a:ext>
             </a:extLst>
           </p:cNvPr>
@@ -5208,14 +5198,14 @@
         </p:nvSpPr>
         <p:spPr>
           <a:xfrm>
-            <a:off x="3302500" y="3369040"/>
+            <a:off x="1334520" y="3123713"/>
             <a:ext cx="360000" cy="360000"/>
           </a:xfrm>
           <a:prstGeom prst="rect">
             <a:avLst/>
           </a:prstGeom>
           <a:solidFill>
-            <a:schemeClr val="accent1">
+            <a:schemeClr val="accent4">
               <a:alpha val="40000"/>
             </a:schemeClr>
           </a:solidFill>
@@ -5252,10 +5242,10 @@
       </p:sp>
       <p:sp>
         <p:nvSpPr>
-          <p:cNvPr id="21" name="Rectangle 14">
-            <a:extLst>
-              <a:ext uri="{FF2B5EF4-FFF2-40B4-BE49-F238E27FC236}">
-                <a16:creationId xmlns:a16="http://schemas.microsoft.com/office/drawing/2014/main" id="{7065EF9F-64F9-9AE5-D2DF-E7E49BC4DC2D}"/>
+          <p:cNvPr id="69" name="Rectangle 14">
+            <a:extLst>
+              <a:ext uri="{FF2B5EF4-FFF2-40B4-BE49-F238E27FC236}">
+                <a16:creationId xmlns:a16="http://schemas.microsoft.com/office/drawing/2014/main" id="{D4E0C7E7-9180-7F26-6874-F6DBF914DD9E}"/>
               </a:ext>
             </a:extLst>
           </p:cNvPr>
@@ -5266,7 +5256,7 @@
         </p:nvSpPr>
         <p:spPr>
           <a:xfrm>
-            <a:off x="3666900" y="1929040"/>
+            <a:off x="1698920" y="1683713"/>
             <a:ext cx="360000" cy="360000"/>
           </a:xfrm>
           <a:prstGeom prst="rect">
@@ -5310,10 +5300,10 @@
       </p:sp>
       <p:sp>
         <p:nvSpPr>
-          <p:cNvPr id="22" name="Rectangle 15">
-            <a:extLst>
-              <a:ext uri="{FF2B5EF4-FFF2-40B4-BE49-F238E27FC236}">
-                <a16:creationId xmlns:a16="http://schemas.microsoft.com/office/drawing/2014/main" id="{35851CD8-4CBA-7694-E467-675FB14FC762}"/>
+          <p:cNvPr id="70" name="Rectangle 15">
+            <a:extLst>
+              <a:ext uri="{FF2B5EF4-FFF2-40B4-BE49-F238E27FC236}">
+                <a16:creationId xmlns:a16="http://schemas.microsoft.com/office/drawing/2014/main" id="{CC83B1D0-D2AE-0E0F-F431-3E44F9023124}"/>
               </a:ext>
             </a:extLst>
           </p:cNvPr>
@@ -5324,7 +5314,7 @@
         </p:nvSpPr>
         <p:spPr>
           <a:xfrm>
-            <a:off x="3666900" y="2287680"/>
+            <a:off x="1698920" y="2042353"/>
             <a:ext cx="360000" cy="360000"/>
           </a:xfrm>
           <a:prstGeom prst="rect">
@@ -5368,10 +5358,10 @@
       </p:sp>
       <p:sp>
         <p:nvSpPr>
-          <p:cNvPr id="23" name="Rectangle 10">
-            <a:extLst>
-              <a:ext uri="{FF2B5EF4-FFF2-40B4-BE49-F238E27FC236}">
-                <a16:creationId xmlns:a16="http://schemas.microsoft.com/office/drawing/2014/main" id="{C7000059-7E53-378C-8E66-CE46DFE36006}"/>
+          <p:cNvPr id="71" name="Rectangle 10">
+            <a:extLst>
+              <a:ext uri="{FF2B5EF4-FFF2-40B4-BE49-F238E27FC236}">
+                <a16:creationId xmlns:a16="http://schemas.microsoft.com/office/drawing/2014/main" id="{52ACBA05-8B9B-773A-E228-77A1503097EF}"/>
               </a:ext>
             </a:extLst>
           </p:cNvPr>
@@ -5382,15 +5372,15 @@
         </p:nvSpPr>
         <p:spPr>
           <a:xfrm>
-            <a:off x="3663600" y="2651760"/>
+            <a:off x="1695620" y="2406433"/>
             <a:ext cx="366600" cy="360000"/>
           </a:xfrm>
           <a:prstGeom prst="rect">
             <a:avLst/>
           </a:prstGeom>
           <a:solidFill>
-            <a:schemeClr val="accent1">
-              <a:alpha val="60000"/>
+            <a:schemeClr val="accent4">
+              <a:alpha val="75000"/>
             </a:schemeClr>
           </a:solidFill>
           <a:ln w="19050">
@@ -5426,10 +5416,10 @@
       </p:sp>
       <p:sp>
         <p:nvSpPr>
-          <p:cNvPr id="24" name="Rectangle 11">
-            <a:extLst>
-              <a:ext uri="{FF2B5EF4-FFF2-40B4-BE49-F238E27FC236}">
-                <a16:creationId xmlns:a16="http://schemas.microsoft.com/office/drawing/2014/main" id="{211D2A56-5DEC-4D19-CDEE-ADE4EE4004A5}"/>
+          <p:cNvPr id="72" name="Rectangle 11">
+            <a:extLst>
+              <a:ext uri="{FF2B5EF4-FFF2-40B4-BE49-F238E27FC236}">
+                <a16:creationId xmlns:a16="http://schemas.microsoft.com/office/drawing/2014/main" id="{0991EB5D-7D66-1339-D530-60055751E0FE}"/>
               </a:ext>
             </a:extLst>
           </p:cNvPr>
@@ -5440,14 +5430,14 @@
         </p:nvSpPr>
         <p:spPr>
           <a:xfrm>
-            <a:off x="3666900" y="3006320"/>
+            <a:off x="1698920" y="2760993"/>
             <a:ext cx="360000" cy="360000"/>
           </a:xfrm>
           <a:prstGeom prst="rect">
             <a:avLst/>
           </a:prstGeom>
           <a:solidFill>
-            <a:schemeClr val="accent1">
+            <a:schemeClr val="accent4">
               <a:alpha val="40000"/>
             </a:schemeClr>
           </a:solidFill>
@@ -5484,10 +5474,10 @@
       </p:sp>
       <p:sp>
         <p:nvSpPr>
-          <p:cNvPr id="25" name="Rectangle 12">
-            <a:extLst>
-              <a:ext uri="{FF2B5EF4-FFF2-40B4-BE49-F238E27FC236}">
-                <a16:creationId xmlns:a16="http://schemas.microsoft.com/office/drawing/2014/main" id="{60CCC538-5DFB-D17A-3843-681EB7A72C3D}"/>
+          <p:cNvPr id="73" name="Rectangle 12">
+            <a:extLst>
+              <a:ext uri="{FF2B5EF4-FFF2-40B4-BE49-F238E27FC236}">
+                <a16:creationId xmlns:a16="http://schemas.microsoft.com/office/drawing/2014/main" id="{C1A57512-BD05-CA1B-9949-8FC26D3748FA}"/>
               </a:ext>
             </a:extLst>
           </p:cNvPr>
@@ -5498,14 +5488,14 @@
         </p:nvSpPr>
         <p:spPr>
           <a:xfrm>
-            <a:off x="3666900" y="3366320"/>
+            <a:off x="1698920" y="3120993"/>
             <a:ext cx="360000" cy="360000"/>
           </a:xfrm>
           <a:prstGeom prst="rect">
             <a:avLst/>
           </a:prstGeom>
           <a:solidFill>
-            <a:schemeClr val="accent1">
+            <a:schemeClr val="accent4">
               <a:alpha val="20000"/>
             </a:schemeClr>
           </a:solidFill>
@@ -5542,10 +5532,10 @@
       </p:sp>
       <p:sp>
         <p:nvSpPr>
-          <p:cNvPr id="31" name="Rectangle 14">
-            <a:extLst>
-              <a:ext uri="{FF2B5EF4-FFF2-40B4-BE49-F238E27FC236}">
-                <a16:creationId xmlns:a16="http://schemas.microsoft.com/office/drawing/2014/main" id="{54DF8CC8-9932-2FA7-B39F-B8EBCE20B8D6}"/>
+          <p:cNvPr id="74" name="Rectangle 14">
+            <a:extLst>
+              <a:ext uri="{FF2B5EF4-FFF2-40B4-BE49-F238E27FC236}">
+                <a16:creationId xmlns:a16="http://schemas.microsoft.com/office/drawing/2014/main" id="{3A1BD250-3530-4CBC-0170-5F1FF134A7D8}"/>
               </a:ext>
             </a:extLst>
           </p:cNvPr>
@@ -5556,7 +5546,7 @@
         </p:nvSpPr>
         <p:spPr>
           <a:xfrm>
-            <a:off x="4026900" y="1929040"/>
+            <a:off x="2058920" y="1683713"/>
             <a:ext cx="360000" cy="360000"/>
           </a:xfrm>
           <a:prstGeom prst="rect">
@@ -5600,10 +5590,10 @@
       </p:sp>
       <p:sp>
         <p:nvSpPr>
-          <p:cNvPr id="32" name="Rectangle 15">
-            <a:extLst>
-              <a:ext uri="{FF2B5EF4-FFF2-40B4-BE49-F238E27FC236}">
-                <a16:creationId xmlns:a16="http://schemas.microsoft.com/office/drawing/2014/main" id="{8B828E50-2C53-1CBB-08E3-426DFDA67066}"/>
+          <p:cNvPr id="75" name="Rectangle 15">
+            <a:extLst>
+              <a:ext uri="{FF2B5EF4-FFF2-40B4-BE49-F238E27FC236}">
+                <a16:creationId xmlns:a16="http://schemas.microsoft.com/office/drawing/2014/main" id="{D4CBA051-DF86-68DB-216D-3C90DA5CEBE6}"/>
               </a:ext>
             </a:extLst>
           </p:cNvPr>
@@ -5614,7 +5604,7 @@
         </p:nvSpPr>
         <p:spPr>
           <a:xfrm>
-            <a:off x="4026900" y="2287680"/>
+            <a:off x="2058920" y="2042353"/>
             <a:ext cx="360000" cy="360000"/>
           </a:xfrm>
           <a:prstGeom prst="rect">
@@ -5658,10 +5648,10 @@
       </p:sp>
       <p:sp>
         <p:nvSpPr>
-          <p:cNvPr id="33" name="Rectangle 10">
-            <a:extLst>
-              <a:ext uri="{FF2B5EF4-FFF2-40B4-BE49-F238E27FC236}">
-                <a16:creationId xmlns:a16="http://schemas.microsoft.com/office/drawing/2014/main" id="{0F8ED21C-2B75-EF28-5F0D-404AC7B8D8E9}"/>
+          <p:cNvPr id="76" name="Rectangle 10">
+            <a:extLst>
+              <a:ext uri="{FF2B5EF4-FFF2-40B4-BE49-F238E27FC236}">
+                <a16:creationId xmlns:a16="http://schemas.microsoft.com/office/drawing/2014/main" id="{7AAEFBE6-699D-3E1A-A56F-24EE97919FCF}"/>
               </a:ext>
             </a:extLst>
           </p:cNvPr>
@@ -5672,14 +5662,14 @@
         </p:nvSpPr>
         <p:spPr>
           <a:xfrm>
-            <a:off x="4026900" y="2649040"/>
+            <a:off x="2058920" y="2403713"/>
             <a:ext cx="360000" cy="360000"/>
           </a:xfrm>
           <a:prstGeom prst="rect">
             <a:avLst/>
           </a:prstGeom>
           <a:solidFill>
-            <a:schemeClr val="accent1">
+            <a:schemeClr val="accent4">
               <a:alpha val="40000"/>
             </a:schemeClr>
           </a:solidFill>
@@ -5716,10 +5706,10 @@
       </p:sp>
       <p:sp>
         <p:nvSpPr>
-          <p:cNvPr id="34" name="Rectangle 11">
-            <a:extLst>
-              <a:ext uri="{FF2B5EF4-FFF2-40B4-BE49-F238E27FC236}">
-                <a16:creationId xmlns:a16="http://schemas.microsoft.com/office/drawing/2014/main" id="{7EF22F73-602B-D9F2-FCAB-DE2199AA5560}"/>
+          <p:cNvPr id="77" name="Rectangle 11">
+            <a:extLst>
+              <a:ext uri="{FF2B5EF4-FFF2-40B4-BE49-F238E27FC236}">
+                <a16:creationId xmlns:a16="http://schemas.microsoft.com/office/drawing/2014/main" id="{F5E5BF79-84CA-63B3-3AB5-1D82D8F83DBF}"/>
               </a:ext>
             </a:extLst>
           </p:cNvPr>
@@ -5730,14 +5720,14 @@
         </p:nvSpPr>
         <p:spPr>
           <a:xfrm>
-            <a:off x="4026900" y="3006320"/>
+            <a:off x="2058920" y="2760993"/>
             <a:ext cx="360000" cy="360000"/>
           </a:xfrm>
           <a:prstGeom prst="rect">
             <a:avLst/>
           </a:prstGeom>
           <a:solidFill>
-            <a:schemeClr val="accent1">
+            <a:schemeClr val="accent4">
               <a:alpha val="20000"/>
             </a:schemeClr>
           </a:solidFill>
@@ -5774,10 +5764,10 @@
       </p:sp>
       <p:sp>
         <p:nvSpPr>
-          <p:cNvPr id="35" name="Rectangle 12">
-            <a:extLst>
-              <a:ext uri="{FF2B5EF4-FFF2-40B4-BE49-F238E27FC236}">
-                <a16:creationId xmlns:a16="http://schemas.microsoft.com/office/drawing/2014/main" id="{0FD71D44-0FBA-0CE9-E51A-DF92AFA7E534}"/>
+          <p:cNvPr id="78" name="Rectangle 12">
+            <a:extLst>
+              <a:ext uri="{FF2B5EF4-FFF2-40B4-BE49-F238E27FC236}">
+                <a16:creationId xmlns:a16="http://schemas.microsoft.com/office/drawing/2014/main" id="{0202389F-16E5-122C-3CDB-ABCAA9740574}"/>
               </a:ext>
             </a:extLst>
           </p:cNvPr>
@@ -5788,14 +5778,14 @@
         </p:nvSpPr>
         <p:spPr>
           <a:xfrm>
-            <a:off x="4026900" y="3366320"/>
+            <a:off x="2058920" y="3120993"/>
             <a:ext cx="360000" cy="360000"/>
           </a:xfrm>
           <a:prstGeom prst="rect">
             <a:avLst/>
           </a:prstGeom>
           <a:solidFill>
-            <a:schemeClr val="accent1">
+            <a:schemeClr val="accent4">
               <a:alpha val="10000"/>
             </a:schemeClr>
           </a:solidFill>
@@ -5827,6 +5817,4123 @@
           <a:p>
             <a:pPr algn="ctr"/>
             <a:endParaRPr lang="LID4096" dirty="0"/>
+          </a:p>
+        </p:txBody>
+      </p:sp>
+      <p:sp>
+        <p:nvSpPr>
+          <p:cNvPr id="79" name="TextBox 8">
+            <a:extLst>
+              <a:ext uri="{FF2B5EF4-FFF2-40B4-BE49-F238E27FC236}">
+                <a16:creationId xmlns:a16="http://schemas.microsoft.com/office/drawing/2014/main" id="{769C5556-5AAF-5B3F-CE2A-06F84F968748}"/>
+              </a:ext>
+            </a:extLst>
+          </p:cNvPr>
+          <p:cNvSpPr txBox="1"/>
+          <p:nvPr/>
+        </p:nvSpPr>
+        <p:spPr>
+          <a:xfrm>
+            <a:off x="601320" y="1754631"/>
+            <a:ext cx="368210" cy="200055"/>
+          </a:xfrm>
+          <a:prstGeom prst="rect">
+            <a:avLst/>
+          </a:prstGeom>
+          <a:noFill/>
+        </p:spPr>
+        <p:txBody>
+          <a:bodyPr wrap="square" rtlCol="0">
+            <a:spAutoFit/>
+          </a:bodyPr>
+          <a:lstStyle/>
+          <a:p>
+            <a:r>
+              <a:rPr lang="sl-SI" sz="700" dirty="0"/>
+              <a:t>-</a:t>
+            </a:r>
+            <a:r>
+              <a:rPr lang="en-US" sz="700" dirty="0"/>
+              <a:t>0.</a:t>
+            </a:r>
+            <a:r>
+              <a:rPr lang="sl-SI" sz="700" dirty="0"/>
+              <a:t>13</a:t>
+            </a:r>
+            <a:endParaRPr lang="LID4096" sz="700" dirty="0"/>
+          </a:p>
+        </p:txBody>
+      </p:sp>
+      <p:sp>
+        <p:nvSpPr>
+          <p:cNvPr id="80" name="TextBox 8">
+            <a:extLst>
+              <a:ext uri="{FF2B5EF4-FFF2-40B4-BE49-F238E27FC236}">
+                <a16:creationId xmlns:a16="http://schemas.microsoft.com/office/drawing/2014/main" id="{2DF0D4F6-B45A-8BE5-A6F1-3522DDF4C4B0}"/>
+              </a:ext>
+            </a:extLst>
+          </p:cNvPr>
+          <p:cNvSpPr txBox="1"/>
+          <p:nvPr/>
+        </p:nvSpPr>
+        <p:spPr>
+          <a:xfrm>
+            <a:off x="968215" y="1748287"/>
+            <a:ext cx="368210" cy="200055"/>
+          </a:xfrm>
+          <a:prstGeom prst="rect">
+            <a:avLst/>
+          </a:prstGeom>
+          <a:noFill/>
+        </p:spPr>
+        <p:txBody>
+          <a:bodyPr wrap="square" rtlCol="0">
+            <a:spAutoFit/>
+          </a:bodyPr>
+          <a:lstStyle/>
+          <a:p>
+            <a:r>
+              <a:rPr lang="sl-SI" sz="700" dirty="0"/>
+              <a:t>-</a:t>
+            </a:r>
+            <a:r>
+              <a:rPr lang="en-US" sz="700" dirty="0"/>
+              <a:t>0.25</a:t>
+            </a:r>
+            <a:endParaRPr lang="LID4096" sz="700" dirty="0"/>
+          </a:p>
+        </p:txBody>
+      </p:sp>
+      <p:sp>
+        <p:nvSpPr>
+          <p:cNvPr id="81" name="TextBox 8">
+            <a:extLst>
+              <a:ext uri="{FF2B5EF4-FFF2-40B4-BE49-F238E27FC236}">
+                <a16:creationId xmlns:a16="http://schemas.microsoft.com/office/drawing/2014/main" id="{4A9267F3-4053-FD84-EB27-78141C8B96C8}"/>
+              </a:ext>
+            </a:extLst>
+          </p:cNvPr>
+          <p:cNvSpPr txBox="1"/>
+          <p:nvPr/>
+        </p:nvSpPr>
+        <p:spPr>
+          <a:xfrm>
+            <a:off x="1317805" y="1741943"/>
+            <a:ext cx="368210" cy="200055"/>
+          </a:xfrm>
+          <a:prstGeom prst="rect">
+            <a:avLst/>
+          </a:prstGeom>
+          <a:noFill/>
+        </p:spPr>
+        <p:txBody>
+          <a:bodyPr wrap="square" rtlCol="0">
+            <a:spAutoFit/>
+          </a:bodyPr>
+          <a:lstStyle/>
+          <a:p>
+            <a:r>
+              <a:rPr lang="sl-SI" sz="700" dirty="0"/>
+              <a:t>-</a:t>
+            </a:r>
+            <a:r>
+              <a:rPr lang="en-US" sz="700" dirty="0"/>
+              <a:t>0.</a:t>
+            </a:r>
+            <a:r>
+              <a:rPr lang="sl-SI" sz="700" dirty="0"/>
+              <a:t>50</a:t>
+            </a:r>
+            <a:endParaRPr lang="LID4096" sz="700" dirty="0"/>
+          </a:p>
+        </p:txBody>
+      </p:sp>
+      <p:sp>
+        <p:nvSpPr>
+          <p:cNvPr id="82" name="TextBox 8">
+            <a:extLst>
+              <a:ext uri="{FF2B5EF4-FFF2-40B4-BE49-F238E27FC236}">
+                <a16:creationId xmlns:a16="http://schemas.microsoft.com/office/drawing/2014/main" id="{3F2B09C0-FE10-FEAB-DEB5-1AE86161BA4F}"/>
+              </a:ext>
+            </a:extLst>
+          </p:cNvPr>
+          <p:cNvSpPr txBox="1"/>
+          <p:nvPr/>
+        </p:nvSpPr>
+        <p:spPr>
+          <a:xfrm>
+            <a:off x="1693930" y="1741943"/>
+            <a:ext cx="368210" cy="200055"/>
+          </a:xfrm>
+          <a:prstGeom prst="rect">
+            <a:avLst/>
+          </a:prstGeom>
+          <a:noFill/>
+        </p:spPr>
+        <p:txBody>
+          <a:bodyPr wrap="square" rtlCol="0">
+            <a:spAutoFit/>
+          </a:bodyPr>
+          <a:lstStyle/>
+          <a:p>
+            <a:r>
+              <a:rPr lang="sl-SI" sz="700" dirty="0"/>
+              <a:t>-</a:t>
+            </a:r>
+            <a:r>
+              <a:rPr lang="en-US" sz="700" dirty="0"/>
+              <a:t>0.25</a:t>
+            </a:r>
+            <a:endParaRPr lang="LID4096" sz="700" dirty="0"/>
+          </a:p>
+        </p:txBody>
+      </p:sp>
+      <p:sp>
+        <p:nvSpPr>
+          <p:cNvPr id="83" name="TextBox 8">
+            <a:extLst>
+              <a:ext uri="{FF2B5EF4-FFF2-40B4-BE49-F238E27FC236}">
+                <a16:creationId xmlns:a16="http://schemas.microsoft.com/office/drawing/2014/main" id="{C2470D74-8E1F-F4CB-6CD9-FA86256F3625}"/>
+              </a:ext>
+            </a:extLst>
+          </p:cNvPr>
+          <p:cNvSpPr txBox="1"/>
+          <p:nvPr/>
+        </p:nvSpPr>
+        <p:spPr>
+          <a:xfrm>
+            <a:off x="2053635" y="1738476"/>
+            <a:ext cx="368210" cy="200055"/>
+          </a:xfrm>
+          <a:prstGeom prst="rect">
+            <a:avLst/>
+          </a:prstGeom>
+          <a:noFill/>
+        </p:spPr>
+        <p:txBody>
+          <a:bodyPr wrap="square" rtlCol="0">
+            <a:spAutoFit/>
+          </a:bodyPr>
+          <a:lstStyle/>
+          <a:p>
+            <a:r>
+              <a:rPr lang="sl-SI" sz="700" dirty="0"/>
+              <a:t>-13</a:t>
+            </a:r>
+            <a:endParaRPr lang="LID4096" sz="700" dirty="0"/>
+          </a:p>
+        </p:txBody>
+      </p:sp>
+      <p:sp>
+        <p:nvSpPr>
+          <p:cNvPr id="84" name="TextBox 8">
+            <a:extLst>
+              <a:ext uri="{FF2B5EF4-FFF2-40B4-BE49-F238E27FC236}">
+                <a16:creationId xmlns:a16="http://schemas.microsoft.com/office/drawing/2014/main" id="{16B9F44A-245C-FB1E-D8F1-3BC77792DFE4}"/>
+              </a:ext>
+            </a:extLst>
+          </p:cNvPr>
+          <p:cNvSpPr txBox="1"/>
+          <p:nvPr/>
+        </p:nvSpPr>
+        <p:spPr>
+          <a:xfrm>
+            <a:off x="610120" y="2122341"/>
+            <a:ext cx="368210" cy="200055"/>
+          </a:xfrm>
+          <a:prstGeom prst="rect">
+            <a:avLst/>
+          </a:prstGeom>
+          <a:noFill/>
+        </p:spPr>
+        <p:txBody>
+          <a:bodyPr wrap="square" rtlCol="0">
+            <a:spAutoFit/>
+          </a:bodyPr>
+          <a:lstStyle/>
+          <a:p>
+            <a:r>
+              <a:rPr lang="sl-SI" sz="700" dirty="0"/>
+              <a:t>-</a:t>
+            </a:r>
+            <a:r>
+              <a:rPr lang="en-US" sz="700" dirty="0"/>
+              <a:t>0.25</a:t>
+            </a:r>
+            <a:endParaRPr lang="LID4096" sz="700" dirty="0"/>
+          </a:p>
+        </p:txBody>
+      </p:sp>
+      <p:sp>
+        <p:nvSpPr>
+          <p:cNvPr id="85" name="TextBox 8">
+            <a:extLst>
+              <a:ext uri="{FF2B5EF4-FFF2-40B4-BE49-F238E27FC236}">
+                <a16:creationId xmlns:a16="http://schemas.microsoft.com/office/drawing/2014/main" id="{617FB2BE-7866-0E4A-23E6-C42FDAD15B5F}"/>
+              </a:ext>
+            </a:extLst>
+          </p:cNvPr>
+          <p:cNvSpPr txBox="1"/>
+          <p:nvPr/>
+        </p:nvSpPr>
+        <p:spPr>
+          <a:xfrm>
+            <a:off x="977015" y="2115997"/>
+            <a:ext cx="368210" cy="215444"/>
+          </a:xfrm>
+          <a:prstGeom prst="rect">
+            <a:avLst/>
+          </a:prstGeom>
+          <a:noFill/>
+        </p:spPr>
+        <p:txBody>
+          <a:bodyPr wrap="square" rtlCol="0">
+            <a:spAutoFit/>
+          </a:bodyPr>
+          <a:lstStyle/>
+          <a:p>
+            <a:r>
+              <a:rPr lang="en-US" sz="800" dirty="0"/>
+              <a:t>0.</a:t>
+            </a:r>
+            <a:r>
+              <a:rPr lang="sl-SI" sz="800" dirty="0"/>
+              <a:t>50</a:t>
+            </a:r>
+            <a:endParaRPr lang="LID4096" sz="800" dirty="0"/>
+          </a:p>
+        </p:txBody>
+      </p:sp>
+      <p:sp>
+        <p:nvSpPr>
+          <p:cNvPr id="86" name="TextBox 8">
+            <a:extLst>
+              <a:ext uri="{FF2B5EF4-FFF2-40B4-BE49-F238E27FC236}">
+                <a16:creationId xmlns:a16="http://schemas.microsoft.com/office/drawing/2014/main" id="{86C98FB9-BB2C-BF5C-C992-276576AA1690}"/>
+              </a:ext>
+            </a:extLst>
+          </p:cNvPr>
+          <p:cNvSpPr txBox="1"/>
+          <p:nvPr/>
+        </p:nvSpPr>
+        <p:spPr>
+          <a:xfrm>
+            <a:off x="1326605" y="2109653"/>
+            <a:ext cx="368210" cy="215444"/>
+          </a:xfrm>
+          <a:prstGeom prst="rect">
+            <a:avLst/>
+          </a:prstGeom>
+          <a:noFill/>
+        </p:spPr>
+        <p:txBody>
+          <a:bodyPr wrap="square" rtlCol="0">
+            <a:spAutoFit/>
+          </a:bodyPr>
+          <a:lstStyle/>
+          <a:p>
+            <a:r>
+              <a:rPr lang="en-US" sz="800" dirty="0"/>
+              <a:t>0.</a:t>
+            </a:r>
+            <a:r>
+              <a:rPr lang="sl-SI" sz="800" dirty="0"/>
+              <a:t>75</a:t>
+            </a:r>
+            <a:endParaRPr lang="LID4096" sz="800" dirty="0"/>
+          </a:p>
+        </p:txBody>
+      </p:sp>
+      <p:sp>
+        <p:nvSpPr>
+          <p:cNvPr id="87" name="TextBox 8">
+            <a:extLst>
+              <a:ext uri="{FF2B5EF4-FFF2-40B4-BE49-F238E27FC236}">
+                <a16:creationId xmlns:a16="http://schemas.microsoft.com/office/drawing/2014/main" id="{C36E93DE-E2B5-CDEC-7876-FD6DC4603C2F}"/>
+              </a:ext>
+            </a:extLst>
+          </p:cNvPr>
+          <p:cNvSpPr txBox="1"/>
+          <p:nvPr/>
+        </p:nvSpPr>
+        <p:spPr>
+          <a:xfrm>
+            <a:off x="1702730" y="2109653"/>
+            <a:ext cx="368210" cy="215444"/>
+          </a:xfrm>
+          <a:prstGeom prst="rect">
+            <a:avLst/>
+          </a:prstGeom>
+          <a:noFill/>
+        </p:spPr>
+        <p:txBody>
+          <a:bodyPr wrap="square" rtlCol="0">
+            <a:spAutoFit/>
+          </a:bodyPr>
+          <a:lstStyle/>
+          <a:p>
+            <a:r>
+              <a:rPr lang="en-US" sz="800" dirty="0"/>
+              <a:t>0.5</a:t>
+            </a:r>
+            <a:r>
+              <a:rPr lang="sl-SI" sz="800" dirty="0"/>
+              <a:t>0</a:t>
+            </a:r>
+            <a:endParaRPr lang="LID4096" sz="800" dirty="0"/>
+          </a:p>
+        </p:txBody>
+      </p:sp>
+      <p:sp>
+        <p:nvSpPr>
+          <p:cNvPr id="88" name="TextBox 8">
+            <a:extLst>
+              <a:ext uri="{FF2B5EF4-FFF2-40B4-BE49-F238E27FC236}">
+                <a16:creationId xmlns:a16="http://schemas.microsoft.com/office/drawing/2014/main" id="{3137CC23-FAC9-7C03-892A-2B847DD8065B}"/>
+              </a:ext>
+            </a:extLst>
+          </p:cNvPr>
+          <p:cNvSpPr txBox="1"/>
+          <p:nvPr/>
+        </p:nvSpPr>
+        <p:spPr>
+          <a:xfrm>
+            <a:off x="2062435" y="2106186"/>
+            <a:ext cx="368210" cy="215444"/>
+          </a:xfrm>
+          <a:prstGeom prst="rect">
+            <a:avLst/>
+          </a:prstGeom>
+          <a:noFill/>
+        </p:spPr>
+        <p:txBody>
+          <a:bodyPr wrap="square" rtlCol="0">
+            <a:spAutoFit/>
+          </a:bodyPr>
+          <a:lstStyle/>
+          <a:p>
+            <a:r>
+              <a:rPr lang="en-US" sz="800" dirty="0"/>
+              <a:t>0.25</a:t>
+            </a:r>
+            <a:endParaRPr lang="LID4096" sz="800" dirty="0"/>
+          </a:p>
+        </p:txBody>
+      </p:sp>
+      <p:sp>
+        <p:nvSpPr>
+          <p:cNvPr id="89" name="TextBox 8">
+            <a:extLst>
+              <a:ext uri="{FF2B5EF4-FFF2-40B4-BE49-F238E27FC236}">
+                <a16:creationId xmlns:a16="http://schemas.microsoft.com/office/drawing/2014/main" id="{2E954B9E-65C4-62EF-7D12-C0AD4A9F129E}"/>
+              </a:ext>
+            </a:extLst>
+          </p:cNvPr>
+          <p:cNvSpPr txBox="1"/>
+          <p:nvPr/>
+        </p:nvSpPr>
+        <p:spPr>
+          <a:xfrm>
+            <a:off x="598395" y="2484811"/>
+            <a:ext cx="368210" cy="200055"/>
+          </a:xfrm>
+          <a:prstGeom prst="rect">
+            <a:avLst/>
+          </a:prstGeom>
+          <a:noFill/>
+        </p:spPr>
+        <p:txBody>
+          <a:bodyPr wrap="square" rtlCol="0">
+            <a:spAutoFit/>
+          </a:bodyPr>
+          <a:lstStyle/>
+          <a:p>
+            <a:r>
+              <a:rPr lang="sl-SI" sz="700" dirty="0"/>
+              <a:t>-</a:t>
+            </a:r>
+            <a:r>
+              <a:rPr lang="en-US" sz="700" dirty="0"/>
+              <a:t>0.5</a:t>
+            </a:r>
+            <a:r>
+              <a:rPr lang="sl-SI" sz="700" dirty="0"/>
+              <a:t>0</a:t>
+            </a:r>
+            <a:endParaRPr lang="LID4096" sz="700" dirty="0"/>
+          </a:p>
+        </p:txBody>
+      </p:sp>
+      <p:sp>
+        <p:nvSpPr>
+          <p:cNvPr id="90" name="TextBox 8">
+            <a:extLst>
+              <a:ext uri="{FF2B5EF4-FFF2-40B4-BE49-F238E27FC236}">
+                <a16:creationId xmlns:a16="http://schemas.microsoft.com/office/drawing/2014/main" id="{E6300397-606C-C9E4-808C-6FE5A1FD9E14}"/>
+              </a:ext>
+            </a:extLst>
+          </p:cNvPr>
+          <p:cNvSpPr txBox="1"/>
+          <p:nvPr/>
+        </p:nvSpPr>
+        <p:spPr>
+          <a:xfrm>
+            <a:off x="965290" y="2478467"/>
+            <a:ext cx="368210" cy="215444"/>
+          </a:xfrm>
+          <a:prstGeom prst="rect">
+            <a:avLst/>
+          </a:prstGeom>
+          <a:noFill/>
+        </p:spPr>
+        <p:txBody>
+          <a:bodyPr wrap="square" rtlCol="0">
+            <a:spAutoFit/>
+          </a:bodyPr>
+          <a:lstStyle/>
+          <a:p>
+            <a:r>
+              <a:rPr lang="en-US" sz="800" dirty="0"/>
+              <a:t>0.</a:t>
+            </a:r>
+            <a:r>
+              <a:rPr lang="sl-SI" sz="800" dirty="0"/>
+              <a:t>75</a:t>
+            </a:r>
+            <a:endParaRPr lang="LID4096" sz="800" dirty="0"/>
+          </a:p>
+        </p:txBody>
+      </p:sp>
+      <p:sp>
+        <p:nvSpPr>
+          <p:cNvPr id="91" name="TextBox 8">
+            <a:extLst>
+              <a:ext uri="{FF2B5EF4-FFF2-40B4-BE49-F238E27FC236}">
+                <a16:creationId xmlns:a16="http://schemas.microsoft.com/office/drawing/2014/main" id="{0F97A3E1-A357-F704-649A-5A4B42041878}"/>
+              </a:ext>
+            </a:extLst>
+          </p:cNvPr>
+          <p:cNvSpPr txBox="1"/>
+          <p:nvPr/>
+        </p:nvSpPr>
+        <p:spPr>
+          <a:xfrm>
+            <a:off x="1314880" y="2472123"/>
+            <a:ext cx="368210" cy="215444"/>
+          </a:xfrm>
+          <a:prstGeom prst="rect">
+            <a:avLst/>
+          </a:prstGeom>
+          <a:noFill/>
+        </p:spPr>
+        <p:txBody>
+          <a:bodyPr wrap="square" rtlCol="0">
+            <a:spAutoFit/>
+          </a:bodyPr>
+          <a:lstStyle/>
+          <a:p>
+            <a:r>
+              <a:rPr lang="sl-SI" sz="800" dirty="0"/>
+              <a:t>1.00</a:t>
+            </a:r>
+            <a:endParaRPr lang="LID4096" sz="800" dirty="0"/>
+          </a:p>
+        </p:txBody>
+      </p:sp>
+      <p:sp>
+        <p:nvSpPr>
+          <p:cNvPr id="92" name="TextBox 8">
+            <a:extLst>
+              <a:ext uri="{FF2B5EF4-FFF2-40B4-BE49-F238E27FC236}">
+                <a16:creationId xmlns:a16="http://schemas.microsoft.com/office/drawing/2014/main" id="{A3FE3F25-409C-F4E4-4680-A1774DBF0BAE}"/>
+              </a:ext>
+            </a:extLst>
+          </p:cNvPr>
+          <p:cNvSpPr txBox="1"/>
+          <p:nvPr/>
+        </p:nvSpPr>
+        <p:spPr>
+          <a:xfrm>
+            <a:off x="1691005" y="2472123"/>
+            <a:ext cx="368210" cy="215444"/>
+          </a:xfrm>
+          <a:prstGeom prst="rect">
+            <a:avLst/>
+          </a:prstGeom>
+          <a:noFill/>
+        </p:spPr>
+        <p:txBody>
+          <a:bodyPr wrap="square" rtlCol="0">
+            <a:spAutoFit/>
+          </a:bodyPr>
+          <a:lstStyle/>
+          <a:p>
+            <a:r>
+              <a:rPr lang="sl-SI" sz="800" dirty="0"/>
+              <a:t>0.75</a:t>
+            </a:r>
+            <a:endParaRPr lang="LID4096" sz="800" dirty="0"/>
+          </a:p>
+        </p:txBody>
+      </p:sp>
+      <p:sp>
+        <p:nvSpPr>
+          <p:cNvPr id="93" name="TextBox 8">
+            <a:extLst>
+              <a:ext uri="{FF2B5EF4-FFF2-40B4-BE49-F238E27FC236}">
+                <a16:creationId xmlns:a16="http://schemas.microsoft.com/office/drawing/2014/main" id="{71BF4475-1823-3E7F-49E7-E2AECB3276D7}"/>
+              </a:ext>
+            </a:extLst>
+          </p:cNvPr>
+          <p:cNvSpPr txBox="1"/>
+          <p:nvPr/>
+        </p:nvSpPr>
+        <p:spPr>
+          <a:xfrm>
+            <a:off x="2050710" y="2468656"/>
+            <a:ext cx="368210" cy="215444"/>
+          </a:xfrm>
+          <a:prstGeom prst="rect">
+            <a:avLst/>
+          </a:prstGeom>
+          <a:noFill/>
+        </p:spPr>
+        <p:txBody>
+          <a:bodyPr wrap="square" rtlCol="0">
+            <a:spAutoFit/>
+          </a:bodyPr>
+          <a:lstStyle/>
+          <a:p>
+            <a:r>
+              <a:rPr lang="sl-SI" sz="800" dirty="0"/>
+              <a:t>0.50</a:t>
+            </a:r>
+            <a:endParaRPr lang="LID4096" sz="800" dirty="0"/>
+          </a:p>
+        </p:txBody>
+      </p:sp>
+      <p:sp>
+        <p:nvSpPr>
+          <p:cNvPr id="94" name="TextBox 8">
+            <a:extLst>
+              <a:ext uri="{FF2B5EF4-FFF2-40B4-BE49-F238E27FC236}">
+                <a16:creationId xmlns:a16="http://schemas.microsoft.com/office/drawing/2014/main" id="{94BA381C-4FB8-1E2C-8B0C-05CCF1961829}"/>
+              </a:ext>
+            </a:extLst>
+          </p:cNvPr>
+          <p:cNvSpPr txBox="1"/>
+          <p:nvPr/>
+        </p:nvSpPr>
+        <p:spPr>
+          <a:xfrm>
+            <a:off x="610120" y="2856377"/>
+            <a:ext cx="368210" cy="200055"/>
+          </a:xfrm>
+          <a:prstGeom prst="rect">
+            <a:avLst/>
+          </a:prstGeom>
+          <a:noFill/>
+        </p:spPr>
+        <p:txBody>
+          <a:bodyPr wrap="square" rtlCol="0">
+            <a:spAutoFit/>
+          </a:bodyPr>
+          <a:lstStyle/>
+          <a:p>
+            <a:r>
+              <a:rPr lang="sl-SI" sz="700" dirty="0"/>
+              <a:t>-</a:t>
+            </a:r>
+            <a:r>
+              <a:rPr lang="en-US" sz="700" dirty="0"/>
+              <a:t>0.25</a:t>
+            </a:r>
+            <a:endParaRPr lang="LID4096" sz="700" dirty="0"/>
+          </a:p>
+        </p:txBody>
+      </p:sp>
+      <p:sp>
+        <p:nvSpPr>
+          <p:cNvPr id="95" name="TextBox 8">
+            <a:extLst>
+              <a:ext uri="{FF2B5EF4-FFF2-40B4-BE49-F238E27FC236}">
+                <a16:creationId xmlns:a16="http://schemas.microsoft.com/office/drawing/2014/main" id="{55F8F160-4035-2EFF-F7D7-D2A49A5AF428}"/>
+              </a:ext>
+            </a:extLst>
+          </p:cNvPr>
+          <p:cNvSpPr txBox="1"/>
+          <p:nvPr/>
+        </p:nvSpPr>
+        <p:spPr>
+          <a:xfrm>
+            <a:off x="977015" y="2850033"/>
+            <a:ext cx="368210" cy="215444"/>
+          </a:xfrm>
+          <a:prstGeom prst="rect">
+            <a:avLst/>
+          </a:prstGeom>
+          <a:noFill/>
+        </p:spPr>
+        <p:txBody>
+          <a:bodyPr wrap="square" rtlCol="0">
+            <a:spAutoFit/>
+          </a:bodyPr>
+          <a:lstStyle/>
+          <a:p>
+            <a:r>
+              <a:rPr lang="en-US" sz="800" dirty="0"/>
+              <a:t>0.</a:t>
+            </a:r>
+            <a:r>
+              <a:rPr lang="sl-SI" sz="800" dirty="0"/>
+              <a:t>50</a:t>
+            </a:r>
+            <a:endParaRPr lang="LID4096" sz="800" dirty="0"/>
+          </a:p>
+        </p:txBody>
+      </p:sp>
+      <p:sp>
+        <p:nvSpPr>
+          <p:cNvPr id="96" name="TextBox 8">
+            <a:extLst>
+              <a:ext uri="{FF2B5EF4-FFF2-40B4-BE49-F238E27FC236}">
+                <a16:creationId xmlns:a16="http://schemas.microsoft.com/office/drawing/2014/main" id="{4A8D1249-B042-9AC0-D744-5B703F0E85B0}"/>
+              </a:ext>
+            </a:extLst>
+          </p:cNvPr>
+          <p:cNvSpPr txBox="1"/>
+          <p:nvPr/>
+        </p:nvSpPr>
+        <p:spPr>
+          <a:xfrm>
+            <a:off x="1326605" y="2843689"/>
+            <a:ext cx="368210" cy="215444"/>
+          </a:xfrm>
+          <a:prstGeom prst="rect">
+            <a:avLst/>
+          </a:prstGeom>
+          <a:noFill/>
+        </p:spPr>
+        <p:txBody>
+          <a:bodyPr wrap="square" rtlCol="0">
+            <a:spAutoFit/>
+          </a:bodyPr>
+          <a:lstStyle/>
+          <a:p>
+            <a:r>
+              <a:rPr lang="sl-SI" sz="800" dirty="0"/>
+              <a:t>0.75</a:t>
+            </a:r>
+            <a:endParaRPr lang="LID4096" sz="800" dirty="0"/>
+          </a:p>
+        </p:txBody>
+      </p:sp>
+      <p:sp>
+        <p:nvSpPr>
+          <p:cNvPr id="97" name="TextBox 8">
+            <a:extLst>
+              <a:ext uri="{FF2B5EF4-FFF2-40B4-BE49-F238E27FC236}">
+                <a16:creationId xmlns:a16="http://schemas.microsoft.com/office/drawing/2014/main" id="{C7479EEB-8B13-13E7-6C09-C7F004B4BE87}"/>
+              </a:ext>
+            </a:extLst>
+          </p:cNvPr>
+          <p:cNvSpPr txBox="1"/>
+          <p:nvPr/>
+        </p:nvSpPr>
+        <p:spPr>
+          <a:xfrm>
+            <a:off x="1702730" y="2843689"/>
+            <a:ext cx="368210" cy="215444"/>
+          </a:xfrm>
+          <a:prstGeom prst="rect">
+            <a:avLst/>
+          </a:prstGeom>
+          <a:noFill/>
+        </p:spPr>
+        <p:txBody>
+          <a:bodyPr wrap="square" rtlCol="0">
+            <a:spAutoFit/>
+          </a:bodyPr>
+          <a:lstStyle/>
+          <a:p>
+            <a:r>
+              <a:rPr lang="en-US" sz="800" dirty="0"/>
+              <a:t>0.</a:t>
+            </a:r>
+            <a:r>
+              <a:rPr lang="sl-SI" sz="800" dirty="0"/>
+              <a:t>50</a:t>
+            </a:r>
+            <a:endParaRPr lang="LID4096" sz="800" dirty="0"/>
+          </a:p>
+        </p:txBody>
+      </p:sp>
+      <p:sp>
+        <p:nvSpPr>
+          <p:cNvPr id="98" name="TextBox 8">
+            <a:extLst>
+              <a:ext uri="{FF2B5EF4-FFF2-40B4-BE49-F238E27FC236}">
+                <a16:creationId xmlns:a16="http://schemas.microsoft.com/office/drawing/2014/main" id="{A56C8A8C-1ADE-B46F-7597-4C8CF6F2E205}"/>
+              </a:ext>
+            </a:extLst>
+          </p:cNvPr>
+          <p:cNvSpPr txBox="1"/>
+          <p:nvPr/>
+        </p:nvSpPr>
+        <p:spPr>
+          <a:xfrm>
+            <a:off x="2062435" y="2840222"/>
+            <a:ext cx="368210" cy="215444"/>
+          </a:xfrm>
+          <a:prstGeom prst="rect">
+            <a:avLst/>
+          </a:prstGeom>
+          <a:noFill/>
+        </p:spPr>
+        <p:txBody>
+          <a:bodyPr wrap="square" rtlCol="0">
+            <a:spAutoFit/>
+          </a:bodyPr>
+          <a:lstStyle/>
+          <a:p>
+            <a:r>
+              <a:rPr lang="en-US" sz="800" dirty="0"/>
+              <a:t>0.25</a:t>
+            </a:r>
+            <a:endParaRPr lang="LID4096" sz="800" dirty="0"/>
+          </a:p>
+        </p:txBody>
+      </p:sp>
+      <p:sp>
+        <p:nvSpPr>
+          <p:cNvPr id="99" name="TextBox 8">
+            <a:extLst>
+              <a:ext uri="{FF2B5EF4-FFF2-40B4-BE49-F238E27FC236}">
+                <a16:creationId xmlns:a16="http://schemas.microsoft.com/office/drawing/2014/main" id="{181D5E47-F576-EE9D-0227-5CAD3D5379C4}"/>
+              </a:ext>
+            </a:extLst>
+          </p:cNvPr>
+          <p:cNvSpPr txBox="1"/>
+          <p:nvPr/>
+        </p:nvSpPr>
+        <p:spPr>
+          <a:xfrm>
+            <a:off x="598100" y="3205152"/>
+            <a:ext cx="368210" cy="200055"/>
+          </a:xfrm>
+          <a:prstGeom prst="rect">
+            <a:avLst/>
+          </a:prstGeom>
+          <a:noFill/>
+        </p:spPr>
+        <p:txBody>
+          <a:bodyPr wrap="square" rtlCol="0">
+            <a:spAutoFit/>
+          </a:bodyPr>
+          <a:lstStyle/>
+          <a:p>
+            <a:r>
+              <a:rPr lang="sl-SI" sz="700" dirty="0"/>
+              <a:t>-</a:t>
+            </a:r>
+            <a:r>
+              <a:rPr lang="en-US" sz="700" dirty="0"/>
+              <a:t>0.</a:t>
+            </a:r>
+            <a:r>
+              <a:rPr lang="sl-SI" sz="700" dirty="0"/>
+              <a:t>13</a:t>
+            </a:r>
+            <a:endParaRPr lang="LID4096" sz="700" dirty="0"/>
+          </a:p>
+        </p:txBody>
+      </p:sp>
+      <p:sp>
+        <p:nvSpPr>
+          <p:cNvPr id="100" name="TextBox 8">
+            <a:extLst>
+              <a:ext uri="{FF2B5EF4-FFF2-40B4-BE49-F238E27FC236}">
+                <a16:creationId xmlns:a16="http://schemas.microsoft.com/office/drawing/2014/main" id="{017F1465-C358-3AE6-997F-B96F4AEFCF77}"/>
+              </a:ext>
+            </a:extLst>
+          </p:cNvPr>
+          <p:cNvSpPr txBox="1"/>
+          <p:nvPr/>
+        </p:nvSpPr>
+        <p:spPr>
+          <a:xfrm>
+            <a:off x="964995" y="3198808"/>
+            <a:ext cx="368210" cy="215444"/>
+          </a:xfrm>
+          <a:prstGeom prst="rect">
+            <a:avLst/>
+          </a:prstGeom>
+          <a:noFill/>
+        </p:spPr>
+        <p:txBody>
+          <a:bodyPr wrap="square" rtlCol="0">
+            <a:spAutoFit/>
+          </a:bodyPr>
+          <a:lstStyle/>
+          <a:p>
+            <a:r>
+              <a:rPr lang="en-US" sz="800" dirty="0"/>
+              <a:t>0.25</a:t>
+            </a:r>
+            <a:endParaRPr lang="LID4096" sz="800" dirty="0"/>
+          </a:p>
+        </p:txBody>
+      </p:sp>
+      <p:sp>
+        <p:nvSpPr>
+          <p:cNvPr id="101" name="TextBox 8">
+            <a:extLst>
+              <a:ext uri="{FF2B5EF4-FFF2-40B4-BE49-F238E27FC236}">
+                <a16:creationId xmlns:a16="http://schemas.microsoft.com/office/drawing/2014/main" id="{A126DAA1-D045-80B3-5327-6D5D4508AF48}"/>
+              </a:ext>
+            </a:extLst>
+          </p:cNvPr>
+          <p:cNvSpPr txBox="1"/>
+          <p:nvPr/>
+        </p:nvSpPr>
+        <p:spPr>
+          <a:xfrm>
+            <a:off x="1314585" y="3192464"/>
+            <a:ext cx="368210" cy="215444"/>
+          </a:xfrm>
+          <a:prstGeom prst="rect">
+            <a:avLst/>
+          </a:prstGeom>
+          <a:noFill/>
+        </p:spPr>
+        <p:txBody>
+          <a:bodyPr wrap="square" rtlCol="0">
+            <a:spAutoFit/>
+          </a:bodyPr>
+          <a:lstStyle/>
+          <a:p>
+            <a:r>
+              <a:rPr lang="en-US" sz="800" dirty="0"/>
+              <a:t>0.</a:t>
+            </a:r>
+            <a:r>
+              <a:rPr lang="sl-SI" sz="800" dirty="0"/>
+              <a:t>50</a:t>
+            </a:r>
+            <a:endParaRPr lang="LID4096" sz="800" dirty="0"/>
+          </a:p>
+        </p:txBody>
+      </p:sp>
+      <p:sp>
+        <p:nvSpPr>
+          <p:cNvPr id="102" name="TextBox 8">
+            <a:extLst>
+              <a:ext uri="{FF2B5EF4-FFF2-40B4-BE49-F238E27FC236}">
+                <a16:creationId xmlns:a16="http://schemas.microsoft.com/office/drawing/2014/main" id="{25CB8AA6-B68B-5717-F828-38E037D11A9E}"/>
+              </a:ext>
+            </a:extLst>
+          </p:cNvPr>
+          <p:cNvSpPr txBox="1"/>
+          <p:nvPr/>
+        </p:nvSpPr>
+        <p:spPr>
+          <a:xfrm>
+            <a:off x="1690710" y="3192464"/>
+            <a:ext cx="368210" cy="215444"/>
+          </a:xfrm>
+          <a:prstGeom prst="rect">
+            <a:avLst/>
+          </a:prstGeom>
+          <a:noFill/>
+        </p:spPr>
+        <p:txBody>
+          <a:bodyPr wrap="square" rtlCol="0">
+            <a:spAutoFit/>
+          </a:bodyPr>
+          <a:lstStyle/>
+          <a:p>
+            <a:r>
+              <a:rPr lang="en-US" sz="800" dirty="0"/>
+              <a:t>0.25</a:t>
+            </a:r>
+            <a:endParaRPr lang="LID4096" sz="800" dirty="0"/>
+          </a:p>
+        </p:txBody>
+      </p:sp>
+      <p:sp>
+        <p:nvSpPr>
+          <p:cNvPr id="103" name="TextBox 8">
+            <a:extLst>
+              <a:ext uri="{FF2B5EF4-FFF2-40B4-BE49-F238E27FC236}">
+                <a16:creationId xmlns:a16="http://schemas.microsoft.com/office/drawing/2014/main" id="{381FA443-018C-CDAD-3274-ABFFA9787FDA}"/>
+              </a:ext>
+            </a:extLst>
+          </p:cNvPr>
+          <p:cNvSpPr txBox="1"/>
+          <p:nvPr/>
+        </p:nvSpPr>
+        <p:spPr>
+          <a:xfrm>
+            <a:off x="2050415" y="3188997"/>
+            <a:ext cx="368210" cy="215444"/>
+          </a:xfrm>
+          <a:prstGeom prst="rect">
+            <a:avLst/>
+          </a:prstGeom>
+          <a:noFill/>
+        </p:spPr>
+        <p:txBody>
+          <a:bodyPr wrap="square" rtlCol="0">
+            <a:spAutoFit/>
+          </a:bodyPr>
+          <a:lstStyle/>
+          <a:p>
+            <a:r>
+              <a:rPr lang="en-US" sz="800" dirty="0"/>
+              <a:t>0.</a:t>
+            </a:r>
+            <a:r>
+              <a:rPr lang="sl-SI" sz="800" dirty="0"/>
+              <a:t>13</a:t>
+            </a:r>
+            <a:endParaRPr lang="LID4096" sz="800" dirty="0"/>
+          </a:p>
+        </p:txBody>
+      </p:sp>
+      <p:sp>
+        <p:nvSpPr>
+          <p:cNvPr id="104" name="Rectangle 1">
+            <a:extLst>
+              <a:ext uri="{FF2B5EF4-FFF2-40B4-BE49-F238E27FC236}">
+                <a16:creationId xmlns:a16="http://schemas.microsoft.com/office/drawing/2014/main" id="{EE524C5F-AA56-A05A-7857-84B26FA44852}"/>
+              </a:ext>
+            </a:extLst>
+          </p:cNvPr>
+          <p:cNvSpPr>
+            <a:spLocks noChangeAspect="1"/>
+          </p:cNvSpPr>
+          <p:nvPr/>
+        </p:nvSpPr>
+        <p:spPr>
+          <a:xfrm>
+            <a:off x="1042238" y="2112419"/>
+            <a:ext cx="1800000" cy="1800000"/>
+          </a:xfrm>
+          <a:prstGeom prst="rect">
+            <a:avLst/>
+          </a:prstGeom>
+          <a:solidFill>
+            <a:schemeClr val="accent1"/>
+          </a:solidFill>
+          <a:ln w="19050">
+            <a:solidFill>
+              <a:schemeClr val="tx1"/>
+            </a:solidFill>
+          </a:ln>
+        </p:spPr>
+        <p:style>
+          <a:lnRef idx="2">
+            <a:schemeClr val="accent1">
+              <a:shade val="15000"/>
+            </a:schemeClr>
+          </a:lnRef>
+          <a:fillRef idx="1">
+            <a:schemeClr val="accent1"/>
+          </a:fillRef>
+          <a:effectRef idx="0">
+            <a:schemeClr val="accent1"/>
+          </a:effectRef>
+          <a:fontRef idx="minor">
+            <a:schemeClr val="lt1"/>
+          </a:fontRef>
+        </p:style>
+        <p:txBody>
+          <a:bodyPr rtlCol="0" anchor="ctr"/>
+          <a:lstStyle/>
+          <a:p>
+            <a:pPr algn="ctr"/>
+            <a:endParaRPr lang="LID4096" dirty="0"/>
+          </a:p>
+        </p:txBody>
+      </p:sp>
+      <p:sp>
+        <p:nvSpPr>
+          <p:cNvPr id="157" name="Rectangle 1">
+            <a:extLst>
+              <a:ext uri="{FF2B5EF4-FFF2-40B4-BE49-F238E27FC236}">
+                <a16:creationId xmlns:a16="http://schemas.microsoft.com/office/drawing/2014/main" id="{9584582B-8B6D-50DB-2111-A6CD29F44682}"/>
+              </a:ext>
+            </a:extLst>
+          </p:cNvPr>
+          <p:cNvSpPr>
+            <a:spLocks noChangeAspect="1"/>
+          </p:cNvSpPr>
+          <p:nvPr/>
+        </p:nvSpPr>
+        <p:spPr>
+          <a:xfrm>
+            <a:off x="1194638" y="2264819"/>
+            <a:ext cx="1800000" cy="1800000"/>
+          </a:xfrm>
+          <a:prstGeom prst="rect">
+            <a:avLst/>
+          </a:prstGeom>
+          <a:solidFill>
+            <a:srgbClr val="235888"/>
+          </a:solidFill>
+          <a:ln w="19050">
+            <a:solidFill>
+              <a:schemeClr val="tx1"/>
+            </a:solidFill>
+          </a:ln>
+        </p:spPr>
+        <p:style>
+          <a:lnRef idx="2">
+            <a:schemeClr val="accent1">
+              <a:shade val="15000"/>
+            </a:schemeClr>
+          </a:lnRef>
+          <a:fillRef idx="1">
+            <a:schemeClr val="accent1"/>
+          </a:fillRef>
+          <a:effectRef idx="0">
+            <a:schemeClr val="accent1"/>
+          </a:effectRef>
+          <a:fontRef idx="minor">
+            <a:schemeClr val="lt1"/>
+          </a:fontRef>
+        </p:style>
+        <p:txBody>
+          <a:bodyPr rtlCol="0" anchor="ctr"/>
+          <a:lstStyle/>
+          <a:p>
+            <a:pPr algn="ctr"/>
+            <a:endParaRPr lang="LID4096" dirty="0"/>
+          </a:p>
+        </p:txBody>
+      </p:sp>
+      <p:sp>
+        <p:nvSpPr>
+          <p:cNvPr id="158" name="Rectangle 1">
+            <a:extLst>
+              <a:ext uri="{FF2B5EF4-FFF2-40B4-BE49-F238E27FC236}">
+                <a16:creationId xmlns:a16="http://schemas.microsoft.com/office/drawing/2014/main" id="{62A60A84-5672-6842-431C-43658443084E}"/>
+              </a:ext>
+            </a:extLst>
+          </p:cNvPr>
+          <p:cNvSpPr>
+            <a:spLocks noChangeAspect="1"/>
+          </p:cNvSpPr>
+          <p:nvPr/>
+        </p:nvSpPr>
+        <p:spPr>
+          <a:xfrm>
+            <a:off x="1347038" y="2417219"/>
+            <a:ext cx="1800000" cy="1800000"/>
+          </a:xfrm>
+          <a:prstGeom prst="rect">
+            <a:avLst/>
+          </a:prstGeom>
+          <a:solidFill>
+            <a:srgbClr val="2C70AE"/>
+          </a:solidFill>
+          <a:ln w="19050">
+            <a:solidFill>
+              <a:schemeClr val="tx1"/>
+            </a:solidFill>
+          </a:ln>
+        </p:spPr>
+        <p:style>
+          <a:lnRef idx="2">
+            <a:schemeClr val="accent1">
+              <a:shade val="15000"/>
+            </a:schemeClr>
+          </a:lnRef>
+          <a:fillRef idx="1">
+            <a:schemeClr val="accent1"/>
+          </a:fillRef>
+          <a:effectRef idx="0">
+            <a:schemeClr val="accent1"/>
+          </a:effectRef>
+          <a:fontRef idx="minor">
+            <a:schemeClr val="lt1"/>
+          </a:fontRef>
+        </p:style>
+        <p:txBody>
+          <a:bodyPr rtlCol="0" anchor="ctr"/>
+          <a:lstStyle/>
+          <a:p>
+            <a:pPr algn="ctr"/>
+            <a:endParaRPr lang="LID4096" dirty="0"/>
+          </a:p>
+        </p:txBody>
+      </p:sp>
+      <p:sp>
+        <p:nvSpPr>
+          <p:cNvPr id="159" name="Rectangle 1">
+            <a:extLst>
+              <a:ext uri="{FF2B5EF4-FFF2-40B4-BE49-F238E27FC236}">
+                <a16:creationId xmlns:a16="http://schemas.microsoft.com/office/drawing/2014/main" id="{ADB0548D-16B3-7E33-7351-53D14EC6D8C4}"/>
+              </a:ext>
+            </a:extLst>
+          </p:cNvPr>
+          <p:cNvSpPr>
+            <a:spLocks noChangeAspect="1"/>
+          </p:cNvSpPr>
+          <p:nvPr/>
+        </p:nvSpPr>
+        <p:spPr>
+          <a:xfrm>
+            <a:off x="1499438" y="2569619"/>
+            <a:ext cx="1800000" cy="1800000"/>
+          </a:xfrm>
+          <a:prstGeom prst="rect">
+            <a:avLst/>
+          </a:prstGeom>
+          <a:solidFill>
+            <a:srgbClr val="BA7741"/>
+          </a:solidFill>
+          <a:ln w="19050">
+            <a:solidFill>
+              <a:schemeClr val="tx1"/>
+            </a:solidFill>
+          </a:ln>
+        </p:spPr>
+        <p:style>
+          <a:lnRef idx="2">
+            <a:schemeClr val="accent1">
+              <a:shade val="15000"/>
+            </a:schemeClr>
+          </a:lnRef>
+          <a:fillRef idx="1">
+            <a:schemeClr val="accent1"/>
+          </a:fillRef>
+          <a:effectRef idx="0">
+            <a:schemeClr val="accent1"/>
+          </a:effectRef>
+          <a:fontRef idx="minor">
+            <a:schemeClr val="lt1"/>
+          </a:fontRef>
+        </p:style>
+        <p:txBody>
+          <a:bodyPr rtlCol="0" anchor="ctr"/>
+          <a:lstStyle/>
+          <a:p>
+            <a:pPr algn="ctr"/>
+            <a:endParaRPr lang="LID4096" dirty="0"/>
+          </a:p>
+        </p:txBody>
+      </p:sp>
+      <p:sp>
+        <p:nvSpPr>
+          <p:cNvPr id="160" name="Rectangle 1">
+            <a:extLst>
+              <a:ext uri="{FF2B5EF4-FFF2-40B4-BE49-F238E27FC236}">
+                <a16:creationId xmlns:a16="http://schemas.microsoft.com/office/drawing/2014/main" id="{67FABC69-B90B-263D-FD54-EDE6ED24887F}"/>
+              </a:ext>
+            </a:extLst>
+          </p:cNvPr>
+          <p:cNvSpPr>
+            <a:spLocks noChangeAspect="1"/>
+          </p:cNvSpPr>
+          <p:nvPr/>
+        </p:nvSpPr>
+        <p:spPr>
+          <a:xfrm>
+            <a:off x="1651838" y="2722019"/>
+            <a:ext cx="1800000" cy="1800000"/>
+          </a:xfrm>
+          <a:prstGeom prst="rect">
+            <a:avLst/>
+          </a:prstGeom>
+          <a:solidFill>
+            <a:srgbClr val="E08F4E"/>
+          </a:solidFill>
+          <a:ln w="19050">
+            <a:solidFill>
+              <a:schemeClr val="tx1"/>
+            </a:solidFill>
+          </a:ln>
+        </p:spPr>
+        <p:style>
+          <a:lnRef idx="2">
+            <a:schemeClr val="accent1">
+              <a:shade val="15000"/>
+            </a:schemeClr>
+          </a:lnRef>
+          <a:fillRef idx="1">
+            <a:schemeClr val="accent1"/>
+          </a:fillRef>
+          <a:effectRef idx="0">
+            <a:schemeClr val="accent1"/>
+          </a:effectRef>
+          <a:fontRef idx="minor">
+            <a:schemeClr val="lt1"/>
+          </a:fontRef>
+        </p:style>
+        <p:txBody>
+          <a:bodyPr rtlCol="0" anchor="ctr"/>
+          <a:lstStyle/>
+          <a:p>
+            <a:pPr algn="ctr"/>
+            <a:endParaRPr lang="LID4096" dirty="0"/>
+          </a:p>
+        </p:txBody>
+      </p:sp>
+      <p:sp>
+        <p:nvSpPr>
+          <p:cNvPr id="161" name="Rectangle 1">
+            <a:extLst>
+              <a:ext uri="{FF2B5EF4-FFF2-40B4-BE49-F238E27FC236}">
+                <a16:creationId xmlns:a16="http://schemas.microsoft.com/office/drawing/2014/main" id="{ADFFA5DC-5514-977C-D14C-D6386F1ED568}"/>
+              </a:ext>
+            </a:extLst>
+          </p:cNvPr>
+          <p:cNvSpPr>
+            <a:spLocks noChangeAspect="1"/>
+          </p:cNvSpPr>
+          <p:nvPr/>
+        </p:nvSpPr>
+        <p:spPr>
+          <a:xfrm>
+            <a:off x="1804238" y="2874419"/>
+            <a:ext cx="1800000" cy="1800000"/>
+          </a:xfrm>
+          <a:prstGeom prst="rect">
+            <a:avLst/>
+          </a:prstGeom>
+          <a:solidFill>
+            <a:srgbClr val="FFB858"/>
+          </a:solidFill>
+          <a:ln w="19050">
+            <a:solidFill>
+              <a:schemeClr val="tx1"/>
+            </a:solidFill>
+          </a:ln>
+        </p:spPr>
+        <p:style>
+          <a:lnRef idx="2">
+            <a:schemeClr val="accent1">
+              <a:shade val="15000"/>
+            </a:schemeClr>
+          </a:lnRef>
+          <a:fillRef idx="1">
+            <a:schemeClr val="accent1"/>
+          </a:fillRef>
+          <a:effectRef idx="0">
+            <a:schemeClr val="accent1"/>
+          </a:effectRef>
+          <a:fontRef idx="minor">
+            <a:schemeClr val="lt1"/>
+          </a:fontRef>
+        </p:style>
+        <p:txBody>
+          <a:bodyPr rtlCol="0" anchor="ctr"/>
+          <a:lstStyle/>
+          <a:p>
+            <a:pPr algn="ctr"/>
+            <a:endParaRPr lang="LID4096" dirty="0"/>
+          </a:p>
+        </p:txBody>
+      </p:sp>
+      <p:sp>
+        <p:nvSpPr>
+          <p:cNvPr id="162" name="Rectangle 1">
+            <a:extLst>
+              <a:ext uri="{FF2B5EF4-FFF2-40B4-BE49-F238E27FC236}">
+                <a16:creationId xmlns:a16="http://schemas.microsoft.com/office/drawing/2014/main" id="{089EEC97-3152-2575-597C-B6271E89E45D}"/>
+              </a:ext>
+            </a:extLst>
+          </p:cNvPr>
+          <p:cNvSpPr>
+            <a:spLocks noChangeAspect="1"/>
+          </p:cNvSpPr>
+          <p:nvPr/>
+        </p:nvSpPr>
+        <p:spPr>
+          <a:xfrm>
+            <a:off x="1956638" y="3026819"/>
+            <a:ext cx="1800000" cy="1800000"/>
+          </a:xfrm>
+          <a:prstGeom prst="rect">
+            <a:avLst/>
+          </a:prstGeom>
+          <a:solidFill>
+            <a:srgbClr val="FFC700"/>
+          </a:solidFill>
+          <a:ln w="19050">
+            <a:solidFill>
+              <a:schemeClr val="tx1"/>
+            </a:solidFill>
+          </a:ln>
+        </p:spPr>
+        <p:style>
+          <a:lnRef idx="2">
+            <a:schemeClr val="accent1">
+              <a:shade val="15000"/>
+            </a:schemeClr>
+          </a:lnRef>
+          <a:fillRef idx="1">
+            <a:schemeClr val="accent1"/>
+          </a:fillRef>
+          <a:effectRef idx="0">
+            <a:schemeClr val="accent1"/>
+          </a:effectRef>
+          <a:fontRef idx="minor">
+            <a:schemeClr val="lt1"/>
+          </a:fontRef>
+        </p:style>
+        <p:txBody>
+          <a:bodyPr rtlCol="0" anchor="ctr"/>
+          <a:lstStyle/>
+          <a:p>
+            <a:pPr algn="ctr"/>
+            <a:endParaRPr lang="LID4096" dirty="0"/>
+          </a:p>
+        </p:txBody>
+      </p:sp>
+      <p:sp>
+        <p:nvSpPr>
+          <p:cNvPr id="163" name="Rectangle 1">
+            <a:extLst>
+              <a:ext uri="{FF2B5EF4-FFF2-40B4-BE49-F238E27FC236}">
+                <a16:creationId xmlns:a16="http://schemas.microsoft.com/office/drawing/2014/main" id="{0DB87F98-6711-F8E6-B1BC-C62123CB52F2}"/>
+              </a:ext>
+            </a:extLst>
+          </p:cNvPr>
+          <p:cNvSpPr>
+            <a:spLocks noChangeAspect="1"/>
+          </p:cNvSpPr>
+          <p:nvPr/>
+        </p:nvSpPr>
+        <p:spPr>
+          <a:xfrm>
+            <a:off x="2109038" y="3179219"/>
+            <a:ext cx="1800000" cy="1800000"/>
+          </a:xfrm>
+          <a:prstGeom prst="rect">
+            <a:avLst/>
+          </a:prstGeom>
+          <a:solidFill>
+            <a:schemeClr val="bg1"/>
+          </a:solidFill>
+          <a:ln w="19050">
+            <a:solidFill>
+              <a:schemeClr val="tx1"/>
+            </a:solidFill>
+          </a:ln>
+        </p:spPr>
+        <p:style>
+          <a:lnRef idx="2">
+            <a:schemeClr val="accent1">
+              <a:shade val="15000"/>
+            </a:schemeClr>
+          </a:lnRef>
+          <a:fillRef idx="1">
+            <a:schemeClr val="accent1"/>
+          </a:fillRef>
+          <a:effectRef idx="0">
+            <a:schemeClr val="accent1"/>
+          </a:effectRef>
+          <a:fontRef idx="minor">
+            <a:schemeClr val="lt1"/>
+          </a:fontRef>
+        </p:style>
+        <p:txBody>
+          <a:bodyPr rtlCol="0" anchor="ctr"/>
+          <a:lstStyle/>
+          <a:p>
+            <a:pPr algn="ctr"/>
+            <a:endParaRPr lang="LID4096" dirty="0"/>
+          </a:p>
+        </p:txBody>
+      </p:sp>
+      <p:sp>
+        <p:nvSpPr>
+          <p:cNvPr id="2" name="Rectangle 1">
+            <a:extLst>
+              <a:ext uri="{FF2B5EF4-FFF2-40B4-BE49-F238E27FC236}">
+                <a16:creationId xmlns:a16="http://schemas.microsoft.com/office/drawing/2014/main" id="{C62ED0E5-CFE1-BD8E-BC2D-9EFD1D256BCA}"/>
+              </a:ext>
+            </a:extLst>
+          </p:cNvPr>
+          <p:cNvSpPr>
+            <a:spLocks noChangeAspect="1"/>
+          </p:cNvSpPr>
+          <p:nvPr/>
+        </p:nvSpPr>
+        <p:spPr>
+          <a:xfrm>
+            <a:off x="2111734" y="3174462"/>
+            <a:ext cx="1800000" cy="1800000"/>
+          </a:xfrm>
+          <a:prstGeom prst="rect">
+            <a:avLst/>
+          </a:prstGeom>
+          <a:solidFill>
+            <a:schemeClr val="bg1"/>
+          </a:solidFill>
+          <a:ln w="19050">
+            <a:solidFill>
+              <a:schemeClr val="tx1"/>
+            </a:solidFill>
+          </a:ln>
+        </p:spPr>
+        <p:style>
+          <a:lnRef idx="2">
+            <a:schemeClr val="accent1">
+              <a:shade val="15000"/>
+            </a:schemeClr>
+          </a:lnRef>
+          <a:fillRef idx="1">
+            <a:schemeClr val="accent1"/>
+          </a:fillRef>
+          <a:effectRef idx="0">
+            <a:schemeClr val="accent1"/>
+          </a:effectRef>
+          <a:fontRef idx="minor">
+            <a:schemeClr val="lt1"/>
+          </a:fontRef>
+        </p:style>
+        <p:txBody>
+          <a:bodyPr rtlCol="0" anchor="ctr"/>
+          <a:lstStyle/>
+          <a:p>
+            <a:pPr algn="ctr"/>
+            <a:endParaRPr lang="LID4096" dirty="0"/>
+          </a:p>
+        </p:txBody>
+      </p:sp>
+      <p:sp>
+        <p:nvSpPr>
+          <p:cNvPr id="4" name="Rectangle 3">
+            <a:extLst>
+              <a:ext uri="{FF2B5EF4-FFF2-40B4-BE49-F238E27FC236}">
+                <a16:creationId xmlns:a16="http://schemas.microsoft.com/office/drawing/2014/main" id="{106F8172-FD52-B40F-A8A6-C9CE8419AB9E}"/>
+              </a:ext>
+            </a:extLst>
+          </p:cNvPr>
+          <p:cNvSpPr>
+            <a:spLocks/>
+          </p:cNvSpPr>
+          <p:nvPr/>
+        </p:nvSpPr>
+        <p:spPr>
+          <a:xfrm>
+            <a:off x="2111734" y="3174462"/>
+            <a:ext cx="360000" cy="360000"/>
+          </a:xfrm>
+          <a:prstGeom prst="rect">
+            <a:avLst/>
+          </a:prstGeom>
+          <a:solidFill>
+            <a:schemeClr val="accent4">
+              <a:alpha val="10000"/>
+            </a:schemeClr>
+          </a:solidFill>
+          <a:ln w="19050">
+            <a:solidFill>
+              <a:schemeClr val="tx1"/>
+            </a:solidFill>
+          </a:ln>
+        </p:spPr>
+        <p:style>
+          <a:lnRef idx="2">
+            <a:schemeClr val="accent1">
+              <a:shade val="15000"/>
+            </a:schemeClr>
+          </a:lnRef>
+          <a:fillRef idx="1">
+            <a:schemeClr val="accent1"/>
+          </a:fillRef>
+          <a:effectRef idx="0">
+            <a:schemeClr val="accent1"/>
+          </a:effectRef>
+          <a:fontRef idx="minor">
+            <a:schemeClr val="lt1"/>
+          </a:fontRef>
+        </p:style>
+        <p:txBody>
+          <a:bodyPr rtlCol="0" anchor="ctr"/>
+          <a:lstStyle/>
+          <a:p>
+            <a:pPr algn="ctr"/>
+            <a:endParaRPr lang="LID4096" dirty="0"/>
+          </a:p>
+        </p:txBody>
+      </p:sp>
+      <p:sp>
+        <p:nvSpPr>
+          <p:cNvPr id="11" name="Rectangle 10">
+            <a:extLst>
+              <a:ext uri="{FF2B5EF4-FFF2-40B4-BE49-F238E27FC236}">
+                <a16:creationId xmlns:a16="http://schemas.microsoft.com/office/drawing/2014/main" id="{C8B3EE9D-2A37-357F-1671-126F3622A250}"/>
+              </a:ext>
+            </a:extLst>
+          </p:cNvPr>
+          <p:cNvSpPr>
+            <a:spLocks/>
+          </p:cNvSpPr>
+          <p:nvPr/>
+        </p:nvSpPr>
+        <p:spPr>
+          <a:xfrm>
+            <a:off x="2111734" y="3534462"/>
+            <a:ext cx="360000" cy="360000"/>
+          </a:xfrm>
+          <a:prstGeom prst="rect">
+            <a:avLst/>
+          </a:prstGeom>
+          <a:solidFill>
+            <a:schemeClr val="accent4">
+              <a:alpha val="20000"/>
+            </a:schemeClr>
+          </a:solidFill>
+          <a:ln w="19050">
+            <a:solidFill>
+              <a:schemeClr val="tx1"/>
+            </a:solidFill>
+          </a:ln>
+        </p:spPr>
+        <p:style>
+          <a:lnRef idx="2">
+            <a:schemeClr val="accent1">
+              <a:shade val="15000"/>
+            </a:schemeClr>
+          </a:lnRef>
+          <a:fillRef idx="1">
+            <a:schemeClr val="accent1"/>
+          </a:fillRef>
+          <a:effectRef idx="0">
+            <a:schemeClr val="accent1"/>
+          </a:effectRef>
+          <a:fontRef idx="minor">
+            <a:schemeClr val="lt1"/>
+          </a:fontRef>
+        </p:style>
+        <p:txBody>
+          <a:bodyPr rtlCol="0" anchor="ctr"/>
+          <a:lstStyle/>
+          <a:p>
+            <a:pPr algn="ctr"/>
+            <a:endParaRPr lang="LID4096" dirty="0"/>
+          </a:p>
+        </p:txBody>
+      </p:sp>
+      <p:sp>
+        <p:nvSpPr>
+          <p:cNvPr id="12" name="Rectangle 11">
+            <a:extLst>
+              <a:ext uri="{FF2B5EF4-FFF2-40B4-BE49-F238E27FC236}">
+                <a16:creationId xmlns:a16="http://schemas.microsoft.com/office/drawing/2014/main" id="{5D47C5BB-216D-5736-373E-ABB640327678}"/>
+              </a:ext>
+            </a:extLst>
+          </p:cNvPr>
+          <p:cNvSpPr>
+            <a:spLocks/>
+          </p:cNvSpPr>
+          <p:nvPr/>
+        </p:nvSpPr>
+        <p:spPr>
+          <a:xfrm>
+            <a:off x="2111734" y="3894462"/>
+            <a:ext cx="360000" cy="360000"/>
+          </a:xfrm>
+          <a:prstGeom prst="rect">
+            <a:avLst/>
+          </a:prstGeom>
+          <a:solidFill>
+            <a:schemeClr val="accent4">
+              <a:alpha val="40000"/>
+            </a:schemeClr>
+          </a:solidFill>
+          <a:ln w="19050">
+            <a:solidFill>
+              <a:schemeClr val="tx1"/>
+            </a:solidFill>
+          </a:ln>
+        </p:spPr>
+        <p:style>
+          <a:lnRef idx="2">
+            <a:schemeClr val="accent1">
+              <a:shade val="15000"/>
+            </a:schemeClr>
+          </a:lnRef>
+          <a:fillRef idx="1">
+            <a:schemeClr val="accent1"/>
+          </a:fillRef>
+          <a:effectRef idx="0">
+            <a:schemeClr val="accent1"/>
+          </a:effectRef>
+          <a:fontRef idx="minor">
+            <a:schemeClr val="lt1"/>
+          </a:fontRef>
+        </p:style>
+        <p:txBody>
+          <a:bodyPr rtlCol="0" anchor="ctr"/>
+          <a:lstStyle/>
+          <a:p>
+            <a:pPr algn="ctr"/>
+            <a:endParaRPr lang="LID4096" dirty="0"/>
+          </a:p>
+        </p:txBody>
+      </p:sp>
+      <p:sp>
+        <p:nvSpPr>
+          <p:cNvPr id="13" name="Rectangle 12">
+            <a:extLst>
+              <a:ext uri="{FF2B5EF4-FFF2-40B4-BE49-F238E27FC236}">
+                <a16:creationId xmlns:a16="http://schemas.microsoft.com/office/drawing/2014/main" id="{C813F7DC-8811-B57F-A554-7C1A6E9BC3B9}"/>
+              </a:ext>
+            </a:extLst>
+          </p:cNvPr>
+          <p:cNvSpPr>
+            <a:spLocks/>
+          </p:cNvSpPr>
+          <p:nvPr/>
+        </p:nvSpPr>
+        <p:spPr>
+          <a:xfrm>
+            <a:off x="2111734" y="4254462"/>
+            <a:ext cx="360000" cy="360000"/>
+          </a:xfrm>
+          <a:prstGeom prst="rect">
+            <a:avLst/>
+          </a:prstGeom>
+          <a:solidFill>
+            <a:schemeClr val="accent4">
+              <a:alpha val="20000"/>
+            </a:schemeClr>
+          </a:solidFill>
+          <a:ln w="19050">
+            <a:solidFill>
+              <a:schemeClr val="tx1"/>
+            </a:solidFill>
+          </a:ln>
+        </p:spPr>
+        <p:style>
+          <a:lnRef idx="2">
+            <a:schemeClr val="accent1">
+              <a:shade val="15000"/>
+            </a:schemeClr>
+          </a:lnRef>
+          <a:fillRef idx="1">
+            <a:schemeClr val="accent1"/>
+          </a:fillRef>
+          <a:effectRef idx="0">
+            <a:schemeClr val="accent1"/>
+          </a:effectRef>
+          <a:fontRef idx="minor">
+            <a:schemeClr val="lt1"/>
+          </a:fontRef>
+        </p:style>
+        <p:txBody>
+          <a:bodyPr rtlCol="0" anchor="ctr"/>
+          <a:lstStyle/>
+          <a:p>
+            <a:pPr algn="ctr"/>
+            <a:endParaRPr lang="LID4096" dirty="0"/>
+          </a:p>
+        </p:txBody>
+      </p:sp>
+      <p:sp>
+        <p:nvSpPr>
+          <p:cNvPr id="14" name="Rectangle 13">
+            <a:extLst>
+              <a:ext uri="{FF2B5EF4-FFF2-40B4-BE49-F238E27FC236}">
+                <a16:creationId xmlns:a16="http://schemas.microsoft.com/office/drawing/2014/main" id="{CF400037-A756-02A8-E7B1-A9CD51A0956E}"/>
+              </a:ext>
+            </a:extLst>
+          </p:cNvPr>
+          <p:cNvSpPr>
+            <a:spLocks/>
+          </p:cNvSpPr>
+          <p:nvPr/>
+        </p:nvSpPr>
+        <p:spPr>
+          <a:xfrm>
+            <a:off x="2111734" y="4614462"/>
+            <a:ext cx="360000" cy="360000"/>
+          </a:xfrm>
+          <a:prstGeom prst="rect">
+            <a:avLst/>
+          </a:prstGeom>
+          <a:solidFill>
+            <a:schemeClr val="accent4">
+              <a:alpha val="10000"/>
+            </a:schemeClr>
+          </a:solidFill>
+          <a:ln w="19050">
+            <a:solidFill>
+              <a:schemeClr val="tx1"/>
+            </a:solidFill>
+          </a:ln>
+        </p:spPr>
+        <p:style>
+          <a:lnRef idx="2">
+            <a:schemeClr val="accent1">
+              <a:shade val="15000"/>
+            </a:schemeClr>
+          </a:lnRef>
+          <a:fillRef idx="1">
+            <a:schemeClr val="accent1"/>
+          </a:fillRef>
+          <a:effectRef idx="0">
+            <a:schemeClr val="accent1"/>
+          </a:effectRef>
+          <a:fontRef idx="minor">
+            <a:schemeClr val="lt1"/>
+          </a:fontRef>
+        </p:style>
+        <p:txBody>
+          <a:bodyPr rtlCol="0" anchor="ctr"/>
+          <a:lstStyle/>
+          <a:p>
+            <a:pPr algn="ctr"/>
+            <a:endParaRPr lang="LID4096" dirty="0"/>
+          </a:p>
+        </p:txBody>
+      </p:sp>
+      <p:sp>
+        <p:nvSpPr>
+          <p:cNvPr id="15" name="Rectangle 14">
+            <a:extLst>
+              <a:ext uri="{FF2B5EF4-FFF2-40B4-BE49-F238E27FC236}">
+                <a16:creationId xmlns:a16="http://schemas.microsoft.com/office/drawing/2014/main" id="{DDCB0C0F-8ACA-0987-C1D6-6CA033B7DAD7}"/>
+              </a:ext>
+            </a:extLst>
+          </p:cNvPr>
+          <p:cNvSpPr>
+            <a:spLocks/>
+          </p:cNvSpPr>
+          <p:nvPr/>
+        </p:nvSpPr>
+        <p:spPr>
+          <a:xfrm>
+            <a:off x="2476134" y="3174462"/>
+            <a:ext cx="360000" cy="360000"/>
+          </a:xfrm>
+          <a:prstGeom prst="rect">
+            <a:avLst/>
+          </a:prstGeom>
+          <a:solidFill>
+            <a:schemeClr val="accent4">
+              <a:alpha val="20000"/>
+            </a:schemeClr>
+          </a:solidFill>
+          <a:ln w="19050">
+            <a:solidFill>
+              <a:schemeClr val="tx1"/>
+            </a:solidFill>
+          </a:ln>
+        </p:spPr>
+        <p:style>
+          <a:lnRef idx="2">
+            <a:schemeClr val="accent1">
+              <a:shade val="15000"/>
+            </a:schemeClr>
+          </a:lnRef>
+          <a:fillRef idx="1">
+            <a:schemeClr val="accent1"/>
+          </a:fillRef>
+          <a:effectRef idx="0">
+            <a:schemeClr val="accent1"/>
+          </a:effectRef>
+          <a:fontRef idx="minor">
+            <a:schemeClr val="lt1"/>
+          </a:fontRef>
+        </p:style>
+        <p:txBody>
+          <a:bodyPr rtlCol="0" anchor="ctr"/>
+          <a:lstStyle/>
+          <a:p>
+            <a:pPr algn="ctr"/>
+            <a:endParaRPr lang="LID4096" dirty="0"/>
+          </a:p>
+        </p:txBody>
+      </p:sp>
+      <p:sp>
+        <p:nvSpPr>
+          <p:cNvPr id="16" name="Rectangle 15">
+            <a:extLst>
+              <a:ext uri="{FF2B5EF4-FFF2-40B4-BE49-F238E27FC236}">
+                <a16:creationId xmlns:a16="http://schemas.microsoft.com/office/drawing/2014/main" id="{9107CDD4-A150-3093-D330-70AA74E1F378}"/>
+              </a:ext>
+            </a:extLst>
+          </p:cNvPr>
+          <p:cNvSpPr>
+            <a:spLocks/>
+          </p:cNvSpPr>
+          <p:nvPr/>
+        </p:nvSpPr>
+        <p:spPr>
+          <a:xfrm>
+            <a:off x="2476134" y="3533102"/>
+            <a:ext cx="360000" cy="360000"/>
+          </a:xfrm>
+          <a:prstGeom prst="rect">
+            <a:avLst/>
+          </a:prstGeom>
+          <a:solidFill>
+            <a:schemeClr val="accent4">
+              <a:alpha val="40000"/>
+            </a:schemeClr>
+          </a:solidFill>
+          <a:ln w="19050">
+            <a:solidFill>
+              <a:schemeClr val="tx1"/>
+            </a:solidFill>
+          </a:ln>
+        </p:spPr>
+        <p:style>
+          <a:lnRef idx="2">
+            <a:schemeClr val="accent1">
+              <a:shade val="15000"/>
+            </a:schemeClr>
+          </a:lnRef>
+          <a:fillRef idx="1">
+            <a:schemeClr val="accent1"/>
+          </a:fillRef>
+          <a:effectRef idx="0">
+            <a:schemeClr val="accent1"/>
+          </a:effectRef>
+          <a:fontRef idx="minor">
+            <a:schemeClr val="lt1"/>
+          </a:fontRef>
+        </p:style>
+        <p:txBody>
+          <a:bodyPr rtlCol="0" anchor="ctr"/>
+          <a:lstStyle/>
+          <a:p>
+            <a:pPr algn="ctr"/>
+            <a:endParaRPr lang="LID4096" dirty="0"/>
+          </a:p>
+        </p:txBody>
+      </p:sp>
+      <p:sp>
+        <p:nvSpPr>
+          <p:cNvPr id="3" name="Rectangle 10">
+            <a:extLst>
+              <a:ext uri="{FF2B5EF4-FFF2-40B4-BE49-F238E27FC236}">
+                <a16:creationId xmlns:a16="http://schemas.microsoft.com/office/drawing/2014/main" id="{B31C93F1-50AD-A15E-D646-A82120503291}"/>
+              </a:ext>
+            </a:extLst>
+          </p:cNvPr>
+          <p:cNvSpPr>
+            <a:spLocks/>
+          </p:cNvSpPr>
+          <p:nvPr/>
+        </p:nvSpPr>
+        <p:spPr>
+          <a:xfrm>
+            <a:off x="2476134" y="3891742"/>
+            <a:ext cx="360000" cy="360000"/>
+          </a:xfrm>
+          <a:prstGeom prst="rect">
+            <a:avLst/>
+          </a:prstGeom>
+          <a:solidFill>
+            <a:schemeClr val="accent4">
+              <a:alpha val="75000"/>
+            </a:schemeClr>
+          </a:solidFill>
+          <a:ln w="19050">
+            <a:solidFill>
+              <a:schemeClr val="tx1"/>
+            </a:solidFill>
+          </a:ln>
+        </p:spPr>
+        <p:style>
+          <a:lnRef idx="2">
+            <a:schemeClr val="accent1">
+              <a:shade val="15000"/>
+            </a:schemeClr>
+          </a:lnRef>
+          <a:fillRef idx="1">
+            <a:schemeClr val="accent1"/>
+          </a:fillRef>
+          <a:effectRef idx="0">
+            <a:schemeClr val="accent1"/>
+          </a:effectRef>
+          <a:fontRef idx="minor">
+            <a:schemeClr val="lt1"/>
+          </a:fontRef>
+        </p:style>
+        <p:txBody>
+          <a:bodyPr rtlCol="0" anchor="ctr"/>
+          <a:lstStyle/>
+          <a:p>
+            <a:pPr algn="ctr"/>
+            <a:endParaRPr lang="LID4096" dirty="0"/>
+          </a:p>
+        </p:txBody>
+      </p:sp>
+      <p:sp>
+        <p:nvSpPr>
+          <p:cNvPr id="5" name="Rectangle 11">
+            <a:extLst>
+              <a:ext uri="{FF2B5EF4-FFF2-40B4-BE49-F238E27FC236}">
+                <a16:creationId xmlns:a16="http://schemas.microsoft.com/office/drawing/2014/main" id="{81938A76-7038-DD87-21E5-3BF82FB26CF7}"/>
+              </a:ext>
+            </a:extLst>
+          </p:cNvPr>
+          <p:cNvSpPr>
+            <a:spLocks/>
+          </p:cNvSpPr>
+          <p:nvPr/>
+        </p:nvSpPr>
+        <p:spPr>
+          <a:xfrm>
+            <a:off x="2476134" y="4251742"/>
+            <a:ext cx="360000" cy="360000"/>
+          </a:xfrm>
+          <a:prstGeom prst="rect">
+            <a:avLst/>
+          </a:prstGeom>
+          <a:solidFill>
+            <a:schemeClr val="accent4">
+              <a:alpha val="40000"/>
+            </a:schemeClr>
+          </a:solidFill>
+          <a:ln w="19050">
+            <a:solidFill>
+              <a:schemeClr val="tx1"/>
+            </a:solidFill>
+          </a:ln>
+        </p:spPr>
+        <p:style>
+          <a:lnRef idx="2">
+            <a:schemeClr val="accent1">
+              <a:shade val="15000"/>
+            </a:schemeClr>
+          </a:lnRef>
+          <a:fillRef idx="1">
+            <a:schemeClr val="accent1"/>
+          </a:fillRef>
+          <a:effectRef idx="0">
+            <a:schemeClr val="accent1"/>
+          </a:effectRef>
+          <a:fontRef idx="minor">
+            <a:schemeClr val="lt1"/>
+          </a:fontRef>
+        </p:style>
+        <p:txBody>
+          <a:bodyPr rtlCol="0" anchor="ctr"/>
+          <a:lstStyle/>
+          <a:p>
+            <a:pPr algn="ctr"/>
+            <a:endParaRPr lang="LID4096" dirty="0"/>
+          </a:p>
+        </p:txBody>
+      </p:sp>
+      <p:sp>
+        <p:nvSpPr>
+          <p:cNvPr id="6" name="Rectangle 12">
+            <a:extLst>
+              <a:ext uri="{FF2B5EF4-FFF2-40B4-BE49-F238E27FC236}">
+                <a16:creationId xmlns:a16="http://schemas.microsoft.com/office/drawing/2014/main" id="{257D6A37-687F-65A0-24E6-AFA8F96B3A15}"/>
+              </a:ext>
+            </a:extLst>
+          </p:cNvPr>
+          <p:cNvSpPr>
+            <a:spLocks/>
+          </p:cNvSpPr>
+          <p:nvPr/>
+        </p:nvSpPr>
+        <p:spPr>
+          <a:xfrm>
+            <a:off x="2476134" y="4611742"/>
+            <a:ext cx="360000" cy="360000"/>
+          </a:xfrm>
+          <a:prstGeom prst="rect">
+            <a:avLst/>
+          </a:prstGeom>
+          <a:solidFill>
+            <a:schemeClr val="accent4">
+              <a:alpha val="20000"/>
+            </a:schemeClr>
+          </a:solidFill>
+          <a:ln w="19050">
+            <a:solidFill>
+              <a:schemeClr val="tx1"/>
+            </a:solidFill>
+          </a:ln>
+        </p:spPr>
+        <p:style>
+          <a:lnRef idx="2">
+            <a:schemeClr val="accent1">
+              <a:shade val="15000"/>
+            </a:schemeClr>
+          </a:lnRef>
+          <a:fillRef idx="1">
+            <a:schemeClr val="accent1"/>
+          </a:fillRef>
+          <a:effectRef idx="0">
+            <a:schemeClr val="accent1"/>
+          </a:effectRef>
+          <a:fontRef idx="minor">
+            <a:schemeClr val="lt1"/>
+          </a:fontRef>
+        </p:style>
+        <p:txBody>
+          <a:bodyPr rtlCol="0" anchor="ctr"/>
+          <a:lstStyle/>
+          <a:p>
+            <a:pPr algn="ctr"/>
+            <a:endParaRPr lang="LID4096" dirty="0"/>
+          </a:p>
+        </p:txBody>
+      </p:sp>
+      <p:sp>
+        <p:nvSpPr>
+          <p:cNvPr id="10" name="Rectangle 3">
+            <a:extLst>
+              <a:ext uri="{FF2B5EF4-FFF2-40B4-BE49-F238E27FC236}">
+                <a16:creationId xmlns:a16="http://schemas.microsoft.com/office/drawing/2014/main" id="{C09AACC7-DEEA-1213-3FA8-049B4A94DC04}"/>
+              </a:ext>
+            </a:extLst>
+          </p:cNvPr>
+          <p:cNvSpPr>
+            <a:spLocks/>
+          </p:cNvSpPr>
+          <p:nvPr/>
+        </p:nvSpPr>
+        <p:spPr>
+          <a:xfrm>
+            <a:off x="2836134" y="3173102"/>
+            <a:ext cx="360000" cy="360000"/>
+          </a:xfrm>
+          <a:prstGeom prst="rect">
+            <a:avLst/>
+          </a:prstGeom>
+          <a:solidFill>
+            <a:schemeClr val="accent4">
+              <a:alpha val="40000"/>
+            </a:schemeClr>
+          </a:solidFill>
+          <a:ln w="19050">
+            <a:solidFill>
+              <a:schemeClr val="tx1"/>
+            </a:solidFill>
+          </a:ln>
+        </p:spPr>
+        <p:style>
+          <a:lnRef idx="2">
+            <a:schemeClr val="accent1">
+              <a:shade val="15000"/>
+            </a:schemeClr>
+          </a:lnRef>
+          <a:fillRef idx="1">
+            <a:schemeClr val="accent1"/>
+          </a:fillRef>
+          <a:effectRef idx="0">
+            <a:schemeClr val="accent1"/>
+          </a:effectRef>
+          <a:fontRef idx="minor">
+            <a:schemeClr val="lt1"/>
+          </a:fontRef>
+        </p:style>
+        <p:txBody>
+          <a:bodyPr rtlCol="0" anchor="ctr"/>
+          <a:lstStyle/>
+          <a:p>
+            <a:pPr algn="ctr"/>
+            <a:endParaRPr lang="LID4096" dirty="0"/>
+          </a:p>
+        </p:txBody>
+      </p:sp>
+      <p:sp>
+        <p:nvSpPr>
+          <p:cNvPr id="17" name="Rectangle 10">
+            <a:extLst>
+              <a:ext uri="{FF2B5EF4-FFF2-40B4-BE49-F238E27FC236}">
+                <a16:creationId xmlns:a16="http://schemas.microsoft.com/office/drawing/2014/main" id="{A1DBB292-168A-8B7D-1263-43F93D8CCAA3}"/>
+              </a:ext>
+            </a:extLst>
+          </p:cNvPr>
+          <p:cNvSpPr>
+            <a:spLocks/>
+          </p:cNvSpPr>
+          <p:nvPr/>
+        </p:nvSpPr>
+        <p:spPr>
+          <a:xfrm>
+            <a:off x="2836134" y="3533102"/>
+            <a:ext cx="360000" cy="360000"/>
+          </a:xfrm>
+          <a:prstGeom prst="rect">
+            <a:avLst/>
+          </a:prstGeom>
+          <a:solidFill>
+            <a:schemeClr val="accent4">
+              <a:alpha val="75000"/>
+            </a:schemeClr>
+          </a:solidFill>
+          <a:ln w="19050">
+            <a:solidFill>
+              <a:schemeClr val="tx1"/>
+            </a:solidFill>
+          </a:ln>
+        </p:spPr>
+        <p:style>
+          <a:lnRef idx="2">
+            <a:schemeClr val="accent1">
+              <a:shade val="15000"/>
+            </a:schemeClr>
+          </a:lnRef>
+          <a:fillRef idx="1">
+            <a:schemeClr val="accent1"/>
+          </a:fillRef>
+          <a:effectRef idx="0">
+            <a:schemeClr val="accent1"/>
+          </a:effectRef>
+          <a:fontRef idx="minor">
+            <a:schemeClr val="lt1"/>
+          </a:fontRef>
+        </p:style>
+        <p:txBody>
+          <a:bodyPr rtlCol="0" anchor="ctr"/>
+          <a:lstStyle/>
+          <a:p>
+            <a:pPr algn="ctr"/>
+            <a:endParaRPr lang="LID4096" dirty="0"/>
+          </a:p>
+        </p:txBody>
+      </p:sp>
+      <p:sp>
+        <p:nvSpPr>
+          <p:cNvPr id="18" name="Rectangle 11">
+            <a:extLst>
+              <a:ext uri="{FF2B5EF4-FFF2-40B4-BE49-F238E27FC236}">
+                <a16:creationId xmlns:a16="http://schemas.microsoft.com/office/drawing/2014/main" id="{10D3CABE-9F94-B063-4886-E23EE418E8EC}"/>
+              </a:ext>
+            </a:extLst>
+          </p:cNvPr>
+          <p:cNvSpPr>
+            <a:spLocks/>
+          </p:cNvSpPr>
+          <p:nvPr/>
+        </p:nvSpPr>
+        <p:spPr>
+          <a:xfrm>
+            <a:off x="2836134" y="3894462"/>
+            <a:ext cx="360000" cy="360000"/>
+          </a:xfrm>
+          <a:prstGeom prst="rect">
+            <a:avLst/>
+          </a:prstGeom>
+          <a:solidFill>
+            <a:schemeClr val="accent4"/>
+          </a:solidFill>
+          <a:ln w="19050">
+            <a:solidFill>
+              <a:schemeClr val="tx1"/>
+            </a:solidFill>
+          </a:ln>
+        </p:spPr>
+        <p:style>
+          <a:lnRef idx="2">
+            <a:schemeClr val="accent1">
+              <a:shade val="15000"/>
+            </a:schemeClr>
+          </a:lnRef>
+          <a:fillRef idx="1">
+            <a:schemeClr val="accent1"/>
+          </a:fillRef>
+          <a:effectRef idx="0">
+            <a:schemeClr val="accent1"/>
+          </a:effectRef>
+          <a:fontRef idx="minor">
+            <a:schemeClr val="lt1"/>
+          </a:fontRef>
+        </p:style>
+        <p:txBody>
+          <a:bodyPr rtlCol="0" anchor="ctr"/>
+          <a:lstStyle/>
+          <a:p>
+            <a:pPr algn="ctr"/>
+            <a:endParaRPr lang="LID4096" dirty="0"/>
+          </a:p>
+        </p:txBody>
+      </p:sp>
+      <p:sp>
+        <p:nvSpPr>
+          <p:cNvPr id="19" name="Rectangle 12">
+            <a:extLst>
+              <a:ext uri="{FF2B5EF4-FFF2-40B4-BE49-F238E27FC236}">
+                <a16:creationId xmlns:a16="http://schemas.microsoft.com/office/drawing/2014/main" id="{109BE6C4-A325-9788-34AF-3A2C7759A290}"/>
+              </a:ext>
+            </a:extLst>
+          </p:cNvPr>
+          <p:cNvSpPr>
+            <a:spLocks/>
+          </p:cNvSpPr>
+          <p:nvPr/>
+        </p:nvSpPr>
+        <p:spPr>
+          <a:xfrm>
+            <a:off x="2836134" y="4253102"/>
+            <a:ext cx="360000" cy="360000"/>
+          </a:xfrm>
+          <a:prstGeom prst="rect">
+            <a:avLst/>
+          </a:prstGeom>
+          <a:solidFill>
+            <a:schemeClr val="accent4">
+              <a:alpha val="75000"/>
+            </a:schemeClr>
+          </a:solidFill>
+          <a:ln w="19050">
+            <a:solidFill>
+              <a:schemeClr val="tx1"/>
+            </a:solidFill>
+          </a:ln>
+        </p:spPr>
+        <p:style>
+          <a:lnRef idx="2">
+            <a:schemeClr val="accent1">
+              <a:shade val="15000"/>
+            </a:schemeClr>
+          </a:lnRef>
+          <a:fillRef idx="1">
+            <a:schemeClr val="accent1"/>
+          </a:fillRef>
+          <a:effectRef idx="0">
+            <a:schemeClr val="accent1"/>
+          </a:effectRef>
+          <a:fontRef idx="minor">
+            <a:schemeClr val="lt1"/>
+          </a:fontRef>
+        </p:style>
+        <p:txBody>
+          <a:bodyPr rtlCol="0" anchor="ctr"/>
+          <a:lstStyle/>
+          <a:p>
+            <a:pPr algn="ctr"/>
+            <a:endParaRPr lang="LID4096" dirty="0"/>
+          </a:p>
+        </p:txBody>
+      </p:sp>
+      <p:sp>
+        <p:nvSpPr>
+          <p:cNvPr id="20" name="Rectangle 13">
+            <a:extLst>
+              <a:ext uri="{FF2B5EF4-FFF2-40B4-BE49-F238E27FC236}">
+                <a16:creationId xmlns:a16="http://schemas.microsoft.com/office/drawing/2014/main" id="{B864A49C-1F9E-A7AA-8520-6DBF8919C54A}"/>
+              </a:ext>
+            </a:extLst>
+          </p:cNvPr>
+          <p:cNvSpPr>
+            <a:spLocks/>
+          </p:cNvSpPr>
+          <p:nvPr/>
+        </p:nvSpPr>
+        <p:spPr>
+          <a:xfrm>
+            <a:off x="2836134" y="4613102"/>
+            <a:ext cx="360000" cy="360000"/>
+          </a:xfrm>
+          <a:prstGeom prst="rect">
+            <a:avLst/>
+          </a:prstGeom>
+          <a:solidFill>
+            <a:schemeClr val="accent4">
+              <a:alpha val="40000"/>
+            </a:schemeClr>
+          </a:solidFill>
+          <a:ln w="19050">
+            <a:solidFill>
+              <a:schemeClr val="tx1"/>
+            </a:solidFill>
+          </a:ln>
+        </p:spPr>
+        <p:style>
+          <a:lnRef idx="2">
+            <a:schemeClr val="accent1">
+              <a:shade val="15000"/>
+            </a:schemeClr>
+          </a:lnRef>
+          <a:fillRef idx="1">
+            <a:schemeClr val="accent1"/>
+          </a:fillRef>
+          <a:effectRef idx="0">
+            <a:schemeClr val="accent1"/>
+          </a:effectRef>
+          <a:fontRef idx="minor">
+            <a:schemeClr val="lt1"/>
+          </a:fontRef>
+        </p:style>
+        <p:txBody>
+          <a:bodyPr rtlCol="0" anchor="ctr"/>
+          <a:lstStyle/>
+          <a:p>
+            <a:pPr algn="ctr"/>
+            <a:endParaRPr lang="LID4096" dirty="0"/>
+          </a:p>
+        </p:txBody>
+      </p:sp>
+      <p:sp>
+        <p:nvSpPr>
+          <p:cNvPr id="21" name="Rectangle 14">
+            <a:extLst>
+              <a:ext uri="{FF2B5EF4-FFF2-40B4-BE49-F238E27FC236}">
+                <a16:creationId xmlns:a16="http://schemas.microsoft.com/office/drawing/2014/main" id="{7065EF9F-64F9-9AE5-D2DF-E7E49BC4DC2D}"/>
+              </a:ext>
+            </a:extLst>
+          </p:cNvPr>
+          <p:cNvSpPr>
+            <a:spLocks/>
+          </p:cNvSpPr>
+          <p:nvPr/>
+        </p:nvSpPr>
+        <p:spPr>
+          <a:xfrm>
+            <a:off x="3200534" y="3173102"/>
+            <a:ext cx="360000" cy="360000"/>
+          </a:xfrm>
+          <a:prstGeom prst="rect">
+            <a:avLst/>
+          </a:prstGeom>
+          <a:solidFill>
+            <a:schemeClr val="accent4">
+              <a:alpha val="20000"/>
+            </a:schemeClr>
+          </a:solidFill>
+          <a:ln w="19050">
+            <a:solidFill>
+              <a:schemeClr val="tx1"/>
+            </a:solidFill>
+          </a:ln>
+        </p:spPr>
+        <p:style>
+          <a:lnRef idx="2">
+            <a:schemeClr val="accent1">
+              <a:shade val="15000"/>
+            </a:schemeClr>
+          </a:lnRef>
+          <a:fillRef idx="1">
+            <a:schemeClr val="accent1"/>
+          </a:fillRef>
+          <a:effectRef idx="0">
+            <a:schemeClr val="accent1"/>
+          </a:effectRef>
+          <a:fontRef idx="minor">
+            <a:schemeClr val="lt1"/>
+          </a:fontRef>
+        </p:style>
+        <p:txBody>
+          <a:bodyPr rtlCol="0" anchor="ctr"/>
+          <a:lstStyle/>
+          <a:p>
+            <a:pPr algn="ctr"/>
+            <a:endParaRPr lang="LID4096" dirty="0"/>
+          </a:p>
+        </p:txBody>
+      </p:sp>
+      <p:sp>
+        <p:nvSpPr>
+          <p:cNvPr id="22" name="Rectangle 15">
+            <a:extLst>
+              <a:ext uri="{FF2B5EF4-FFF2-40B4-BE49-F238E27FC236}">
+                <a16:creationId xmlns:a16="http://schemas.microsoft.com/office/drawing/2014/main" id="{35851CD8-4CBA-7694-E467-675FB14FC762}"/>
+              </a:ext>
+            </a:extLst>
+          </p:cNvPr>
+          <p:cNvSpPr>
+            <a:spLocks/>
+          </p:cNvSpPr>
+          <p:nvPr/>
+        </p:nvSpPr>
+        <p:spPr>
+          <a:xfrm>
+            <a:off x="3200534" y="3531742"/>
+            <a:ext cx="360000" cy="360000"/>
+          </a:xfrm>
+          <a:prstGeom prst="rect">
+            <a:avLst/>
+          </a:prstGeom>
+          <a:solidFill>
+            <a:schemeClr val="accent4">
+              <a:alpha val="40000"/>
+            </a:schemeClr>
+          </a:solidFill>
+          <a:ln w="19050">
+            <a:solidFill>
+              <a:schemeClr val="tx1"/>
+            </a:solidFill>
+          </a:ln>
+        </p:spPr>
+        <p:style>
+          <a:lnRef idx="2">
+            <a:schemeClr val="accent1">
+              <a:shade val="15000"/>
+            </a:schemeClr>
+          </a:lnRef>
+          <a:fillRef idx="1">
+            <a:schemeClr val="accent1"/>
+          </a:fillRef>
+          <a:effectRef idx="0">
+            <a:schemeClr val="accent1"/>
+          </a:effectRef>
+          <a:fontRef idx="minor">
+            <a:schemeClr val="lt1"/>
+          </a:fontRef>
+        </p:style>
+        <p:txBody>
+          <a:bodyPr rtlCol="0" anchor="ctr"/>
+          <a:lstStyle/>
+          <a:p>
+            <a:pPr algn="ctr"/>
+            <a:endParaRPr lang="LID4096" dirty="0"/>
+          </a:p>
+        </p:txBody>
+      </p:sp>
+      <p:sp>
+        <p:nvSpPr>
+          <p:cNvPr id="23" name="Rectangle 10">
+            <a:extLst>
+              <a:ext uri="{FF2B5EF4-FFF2-40B4-BE49-F238E27FC236}">
+                <a16:creationId xmlns:a16="http://schemas.microsoft.com/office/drawing/2014/main" id="{C7000059-7E53-378C-8E66-CE46DFE36006}"/>
+              </a:ext>
+            </a:extLst>
+          </p:cNvPr>
+          <p:cNvSpPr>
+            <a:spLocks/>
+          </p:cNvSpPr>
+          <p:nvPr/>
+        </p:nvSpPr>
+        <p:spPr>
+          <a:xfrm>
+            <a:off x="3197234" y="3895822"/>
+            <a:ext cx="366600" cy="360000"/>
+          </a:xfrm>
+          <a:prstGeom prst="rect">
+            <a:avLst/>
+          </a:prstGeom>
+          <a:solidFill>
+            <a:schemeClr val="accent4">
+              <a:alpha val="75000"/>
+            </a:schemeClr>
+          </a:solidFill>
+          <a:ln w="19050">
+            <a:solidFill>
+              <a:schemeClr val="tx1"/>
+            </a:solidFill>
+          </a:ln>
+        </p:spPr>
+        <p:style>
+          <a:lnRef idx="2">
+            <a:schemeClr val="accent1">
+              <a:shade val="15000"/>
+            </a:schemeClr>
+          </a:lnRef>
+          <a:fillRef idx="1">
+            <a:schemeClr val="accent1"/>
+          </a:fillRef>
+          <a:effectRef idx="0">
+            <a:schemeClr val="accent1"/>
+          </a:effectRef>
+          <a:fontRef idx="minor">
+            <a:schemeClr val="lt1"/>
+          </a:fontRef>
+        </p:style>
+        <p:txBody>
+          <a:bodyPr rtlCol="0" anchor="ctr"/>
+          <a:lstStyle/>
+          <a:p>
+            <a:pPr algn="ctr"/>
+            <a:endParaRPr lang="LID4096" dirty="0"/>
+          </a:p>
+        </p:txBody>
+      </p:sp>
+      <p:sp>
+        <p:nvSpPr>
+          <p:cNvPr id="24" name="Rectangle 11">
+            <a:extLst>
+              <a:ext uri="{FF2B5EF4-FFF2-40B4-BE49-F238E27FC236}">
+                <a16:creationId xmlns:a16="http://schemas.microsoft.com/office/drawing/2014/main" id="{211D2A56-5DEC-4D19-CDEE-ADE4EE4004A5}"/>
+              </a:ext>
+            </a:extLst>
+          </p:cNvPr>
+          <p:cNvSpPr>
+            <a:spLocks/>
+          </p:cNvSpPr>
+          <p:nvPr/>
+        </p:nvSpPr>
+        <p:spPr>
+          <a:xfrm>
+            <a:off x="3200534" y="4250382"/>
+            <a:ext cx="360000" cy="360000"/>
+          </a:xfrm>
+          <a:prstGeom prst="rect">
+            <a:avLst/>
+          </a:prstGeom>
+          <a:solidFill>
+            <a:schemeClr val="accent4">
+              <a:alpha val="40000"/>
+            </a:schemeClr>
+          </a:solidFill>
+          <a:ln w="19050">
+            <a:solidFill>
+              <a:schemeClr val="tx1"/>
+            </a:solidFill>
+          </a:ln>
+        </p:spPr>
+        <p:style>
+          <a:lnRef idx="2">
+            <a:schemeClr val="accent1">
+              <a:shade val="15000"/>
+            </a:schemeClr>
+          </a:lnRef>
+          <a:fillRef idx="1">
+            <a:schemeClr val="accent1"/>
+          </a:fillRef>
+          <a:effectRef idx="0">
+            <a:schemeClr val="accent1"/>
+          </a:effectRef>
+          <a:fontRef idx="minor">
+            <a:schemeClr val="lt1"/>
+          </a:fontRef>
+        </p:style>
+        <p:txBody>
+          <a:bodyPr rtlCol="0" anchor="ctr"/>
+          <a:lstStyle/>
+          <a:p>
+            <a:pPr algn="ctr"/>
+            <a:endParaRPr lang="LID4096" dirty="0"/>
+          </a:p>
+        </p:txBody>
+      </p:sp>
+      <p:sp>
+        <p:nvSpPr>
+          <p:cNvPr id="25" name="Rectangle 12">
+            <a:extLst>
+              <a:ext uri="{FF2B5EF4-FFF2-40B4-BE49-F238E27FC236}">
+                <a16:creationId xmlns:a16="http://schemas.microsoft.com/office/drawing/2014/main" id="{60CCC538-5DFB-D17A-3843-681EB7A72C3D}"/>
+              </a:ext>
+            </a:extLst>
+          </p:cNvPr>
+          <p:cNvSpPr>
+            <a:spLocks/>
+          </p:cNvSpPr>
+          <p:nvPr/>
+        </p:nvSpPr>
+        <p:spPr>
+          <a:xfrm>
+            <a:off x="3200534" y="4610382"/>
+            <a:ext cx="360000" cy="360000"/>
+          </a:xfrm>
+          <a:prstGeom prst="rect">
+            <a:avLst/>
+          </a:prstGeom>
+          <a:solidFill>
+            <a:schemeClr val="accent4">
+              <a:alpha val="20000"/>
+            </a:schemeClr>
+          </a:solidFill>
+          <a:ln w="19050">
+            <a:solidFill>
+              <a:schemeClr val="tx1"/>
+            </a:solidFill>
+          </a:ln>
+        </p:spPr>
+        <p:style>
+          <a:lnRef idx="2">
+            <a:schemeClr val="accent1">
+              <a:shade val="15000"/>
+            </a:schemeClr>
+          </a:lnRef>
+          <a:fillRef idx="1">
+            <a:schemeClr val="accent1"/>
+          </a:fillRef>
+          <a:effectRef idx="0">
+            <a:schemeClr val="accent1"/>
+          </a:effectRef>
+          <a:fontRef idx="minor">
+            <a:schemeClr val="lt1"/>
+          </a:fontRef>
+        </p:style>
+        <p:txBody>
+          <a:bodyPr rtlCol="0" anchor="ctr"/>
+          <a:lstStyle/>
+          <a:p>
+            <a:pPr algn="ctr"/>
+            <a:endParaRPr lang="LID4096" dirty="0"/>
+          </a:p>
+        </p:txBody>
+      </p:sp>
+      <p:sp>
+        <p:nvSpPr>
+          <p:cNvPr id="31" name="Rectangle 14">
+            <a:extLst>
+              <a:ext uri="{FF2B5EF4-FFF2-40B4-BE49-F238E27FC236}">
+                <a16:creationId xmlns:a16="http://schemas.microsoft.com/office/drawing/2014/main" id="{54DF8CC8-9932-2FA7-B39F-B8EBCE20B8D6}"/>
+              </a:ext>
+            </a:extLst>
+          </p:cNvPr>
+          <p:cNvSpPr>
+            <a:spLocks/>
+          </p:cNvSpPr>
+          <p:nvPr/>
+        </p:nvSpPr>
+        <p:spPr>
+          <a:xfrm>
+            <a:off x="3560534" y="3173102"/>
+            <a:ext cx="360000" cy="360000"/>
+          </a:xfrm>
+          <a:prstGeom prst="rect">
+            <a:avLst/>
+          </a:prstGeom>
+          <a:solidFill>
+            <a:schemeClr val="accent4">
+              <a:alpha val="10000"/>
+            </a:schemeClr>
+          </a:solidFill>
+          <a:ln w="19050">
+            <a:solidFill>
+              <a:schemeClr val="tx1"/>
+            </a:solidFill>
+          </a:ln>
+        </p:spPr>
+        <p:style>
+          <a:lnRef idx="2">
+            <a:schemeClr val="accent1">
+              <a:shade val="15000"/>
+            </a:schemeClr>
+          </a:lnRef>
+          <a:fillRef idx="1">
+            <a:schemeClr val="accent1"/>
+          </a:fillRef>
+          <a:effectRef idx="0">
+            <a:schemeClr val="accent1"/>
+          </a:effectRef>
+          <a:fontRef idx="minor">
+            <a:schemeClr val="lt1"/>
+          </a:fontRef>
+        </p:style>
+        <p:txBody>
+          <a:bodyPr rtlCol="0" anchor="ctr"/>
+          <a:lstStyle/>
+          <a:p>
+            <a:pPr algn="ctr"/>
+            <a:endParaRPr lang="LID4096" dirty="0"/>
+          </a:p>
+        </p:txBody>
+      </p:sp>
+      <p:sp>
+        <p:nvSpPr>
+          <p:cNvPr id="32" name="Rectangle 15">
+            <a:extLst>
+              <a:ext uri="{FF2B5EF4-FFF2-40B4-BE49-F238E27FC236}">
+                <a16:creationId xmlns:a16="http://schemas.microsoft.com/office/drawing/2014/main" id="{8B828E50-2C53-1CBB-08E3-426DFDA67066}"/>
+              </a:ext>
+            </a:extLst>
+          </p:cNvPr>
+          <p:cNvSpPr>
+            <a:spLocks/>
+          </p:cNvSpPr>
+          <p:nvPr/>
+        </p:nvSpPr>
+        <p:spPr>
+          <a:xfrm>
+            <a:off x="3560534" y="3531742"/>
+            <a:ext cx="360000" cy="360000"/>
+          </a:xfrm>
+          <a:prstGeom prst="rect">
+            <a:avLst/>
+          </a:prstGeom>
+          <a:solidFill>
+            <a:schemeClr val="accent4">
+              <a:alpha val="20000"/>
+            </a:schemeClr>
+          </a:solidFill>
+          <a:ln w="19050">
+            <a:solidFill>
+              <a:schemeClr val="tx1"/>
+            </a:solidFill>
+          </a:ln>
+        </p:spPr>
+        <p:style>
+          <a:lnRef idx="2">
+            <a:schemeClr val="accent1">
+              <a:shade val="15000"/>
+            </a:schemeClr>
+          </a:lnRef>
+          <a:fillRef idx="1">
+            <a:schemeClr val="accent1"/>
+          </a:fillRef>
+          <a:effectRef idx="0">
+            <a:schemeClr val="accent1"/>
+          </a:effectRef>
+          <a:fontRef idx="minor">
+            <a:schemeClr val="lt1"/>
+          </a:fontRef>
+        </p:style>
+        <p:txBody>
+          <a:bodyPr rtlCol="0" anchor="ctr"/>
+          <a:lstStyle/>
+          <a:p>
+            <a:pPr algn="ctr"/>
+            <a:endParaRPr lang="LID4096" dirty="0"/>
+          </a:p>
+        </p:txBody>
+      </p:sp>
+      <p:sp>
+        <p:nvSpPr>
+          <p:cNvPr id="33" name="Rectangle 10">
+            <a:extLst>
+              <a:ext uri="{FF2B5EF4-FFF2-40B4-BE49-F238E27FC236}">
+                <a16:creationId xmlns:a16="http://schemas.microsoft.com/office/drawing/2014/main" id="{0F8ED21C-2B75-EF28-5F0D-404AC7B8D8E9}"/>
+              </a:ext>
+            </a:extLst>
+          </p:cNvPr>
+          <p:cNvSpPr>
+            <a:spLocks/>
+          </p:cNvSpPr>
+          <p:nvPr/>
+        </p:nvSpPr>
+        <p:spPr>
+          <a:xfrm>
+            <a:off x="3560534" y="3893102"/>
+            <a:ext cx="360000" cy="360000"/>
+          </a:xfrm>
+          <a:prstGeom prst="rect">
+            <a:avLst/>
+          </a:prstGeom>
+          <a:solidFill>
+            <a:schemeClr val="accent4">
+              <a:alpha val="40000"/>
+            </a:schemeClr>
+          </a:solidFill>
+          <a:ln w="19050">
+            <a:solidFill>
+              <a:schemeClr val="tx1"/>
+            </a:solidFill>
+          </a:ln>
+        </p:spPr>
+        <p:style>
+          <a:lnRef idx="2">
+            <a:schemeClr val="accent1">
+              <a:shade val="15000"/>
+            </a:schemeClr>
+          </a:lnRef>
+          <a:fillRef idx="1">
+            <a:schemeClr val="accent1"/>
+          </a:fillRef>
+          <a:effectRef idx="0">
+            <a:schemeClr val="accent1"/>
+          </a:effectRef>
+          <a:fontRef idx="minor">
+            <a:schemeClr val="lt1"/>
+          </a:fontRef>
+        </p:style>
+        <p:txBody>
+          <a:bodyPr rtlCol="0" anchor="ctr"/>
+          <a:lstStyle/>
+          <a:p>
+            <a:pPr algn="ctr"/>
+            <a:endParaRPr lang="LID4096" dirty="0"/>
+          </a:p>
+        </p:txBody>
+      </p:sp>
+      <p:sp>
+        <p:nvSpPr>
+          <p:cNvPr id="34" name="Rectangle 11">
+            <a:extLst>
+              <a:ext uri="{FF2B5EF4-FFF2-40B4-BE49-F238E27FC236}">
+                <a16:creationId xmlns:a16="http://schemas.microsoft.com/office/drawing/2014/main" id="{7EF22F73-602B-D9F2-FCAB-DE2199AA5560}"/>
+              </a:ext>
+            </a:extLst>
+          </p:cNvPr>
+          <p:cNvSpPr>
+            <a:spLocks/>
+          </p:cNvSpPr>
+          <p:nvPr/>
+        </p:nvSpPr>
+        <p:spPr>
+          <a:xfrm>
+            <a:off x="3560534" y="4250382"/>
+            <a:ext cx="360000" cy="360000"/>
+          </a:xfrm>
+          <a:prstGeom prst="rect">
+            <a:avLst/>
+          </a:prstGeom>
+          <a:solidFill>
+            <a:schemeClr val="accent4">
+              <a:alpha val="20000"/>
+            </a:schemeClr>
+          </a:solidFill>
+          <a:ln w="19050">
+            <a:solidFill>
+              <a:schemeClr val="tx1"/>
+            </a:solidFill>
+          </a:ln>
+        </p:spPr>
+        <p:style>
+          <a:lnRef idx="2">
+            <a:schemeClr val="accent1">
+              <a:shade val="15000"/>
+            </a:schemeClr>
+          </a:lnRef>
+          <a:fillRef idx="1">
+            <a:schemeClr val="accent1"/>
+          </a:fillRef>
+          <a:effectRef idx="0">
+            <a:schemeClr val="accent1"/>
+          </a:effectRef>
+          <a:fontRef idx="minor">
+            <a:schemeClr val="lt1"/>
+          </a:fontRef>
+        </p:style>
+        <p:txBody>
+          <a:bodyPr rtlCol="0" anchor="ctr"/>
+          <a:lstStyle/>
+          <a:p>
+            <a:pPr algn="ctr"/>
+            <a:endParaRPr lang="LID4096" dirty="0"/>
+          </a:p>
+        </p:txBody>
+      </p:sp>
+      <p:sp>
+        <p:nvSpPr>
+          <p:cNvPr id="35" name="Rectangle 12">
+            <a:extLst>
+              <a:ext uri="{FF2B5EF4-FFF2-40B4-BE49-F238E27FC236}">
+                <a16:creationId xmlns:a16="http://schemas.microsoft.com/office/drawing/2014/main" id="{0FD71D44-0FBA-0CE9-E51A-DF92AFA7E534}"/>
+              </a:ext>
+            </a:extLst>
+          </p:cNvPr>
+          <p:cNvSpPr>
+            <a:spLocks/>
+          </p:cNvSpPr>
+          <p:nvPr/>
+        </p:nvSpPr>
+        <p:spPr>
+          <a:xfrm>
+            <a:off x="3560534" y="4610382"/>
+            <a:ext cx="360000" cy="360000"/>
+          </a:xfrm>
+          <a:prstGeom prst="rect">
+            <a:avLst/>
+          </a:prstGeom>
+          <a:solidFill>
+            <a:schemeClr val="accent4">
+              <a:alpha val="10000"/>
+            </a:schemeClr>
+          </a:solidFill>
+          <a:ln w="19050">
+            <a:solidFill>
+              <a:schemeClr val="tx1"/>
+            </a:solidFill>
+          </a:ln>
+        </p:spPr>
+        <p:style>
+          <a:lnRef idx="2">
+            <a:schemeClr val="accent1">
+              <a:shade val="15000"/>
+            </a:schemeClr>
+          </a:lnRef>
+          <a:fillRef idx="1">
+            <a:schemeClr val="accent1"/>
+          </a:fillRef>
+          <a:effectRef idx="0">
+            <a:schemeClr val="accent1"/>
+          </a:effectRef>
+          <a:fontRef idx="minor">
+            <a:schemeClr val="lt1"/>
+          </a:fontRef>
+        </p:style>
+        <p:txBody>
+          <a:bodyPr rtlCol="0" anchor="ctr"/>
+          <a:lstStyle/>
+          <a:p>
+            <a:pPr algn="ctr"/>
+            <a:endParaRPr lang="LID4096" dirty="0"/>
+          </a:p>
+        </p:txBody>
+      </p:sp>
+      <p:sp>
+        <p:nvSpPr>
+          <p:cNvPr id="7" name="TextBox 8">
+            <a:extLst>
+              <a:ext uri="{FF2B5EF4-FFF2-40B4-BE49-F238E27FC236}">
+                <a16:creationId xmlns:a16="http://schemas.microsoft.com/office/drawing/2014/main" id="{7F6CF0C5-BE48-F6BB-D843-4B9FAFEEA6E3}"/>
+              </a:ext>
+            </a:extLst>
+          </p:cNvPr>
+          <p:cNvSpPr txBox="1"/>
+          <p:nvPr/>
+        </p:nvSpPr>
+        <p:spPr>
+          <a:xfrm>
+            <a:off x="2102934" y="3244020"/>
+            <a:ext cx="368210" cy="215444"/>
+          </a:xfrm>
+          <a:prstGeom prst="rect">
+            <a:avLst/>
+          </a:prstGeom>
+          <a:noFill/>
+        </p:spPr>
+        <p:txBody>
+          <a:bodyPr wrap="square" rtlCol="0">
+            <a:spAutoFit/>
+          </a:bodyPr>
+          <a:lstStyle/>
+          <a:p>
+            <a:r>
+              <a:rPr lang="en-US" sz="800" dirty="0"/>
+              <a:t>0.</a:t>
+            </a:r>
+            <a:r>
+              <a:rPr lang="sl-SI" sz="800" dirty="0"/>
+              <a:t>13</a:t>
+            </a:r>
+            <a:endParaRPr lang="LID4096" sz="800" dirty="0"/>
+          </a:p>
+        </p:txBody>
+      </p:sp>
+      <p:sp>
+        <p:nvSpPr>
+          <p:cNvPr id="8" name="TextBox 8">
+            <a:extLst>
+              <a:ext uri="{FF2B5EF4-FFF2-40B4-BE49-F238E27FC236}">
+                <a16:creationId xmlns:a16="http://schemas.microsoft.com/office/drawing/2014/main" id="{85ABEFA1-F4F4-3E4D-79CD-EC3EBA5577CF}"/>
+              </a:ext>
+            </a:extLst>
+          </p:cNvPr>
+          <p:cNvSpPr txBox="1"/>
+          <p:nvPr/>
+        </p:nvSpPr>
+        <p:spPr>
+          <a:xfrm>
+            <a:off x="2469829" y="3237676"/>
+            <a:ext cx="368210" cy="215444"/>
+          </a:xfrm>
+          <a:prstGeom prst="rect">
+            <a:avLst/>
+          </a:prstGeom>
+          <a:noFill/>
+        </p:spPr>
+        <p:txBody>
+          <a:bodyPr wrap="square" rtlCol="0">
+            <a:spAutoFit/>
+          </a:bodyPr>
+          <a:lstStyle/>
+          <a:p>
+            <a:r>
+              <a:rPr lang="en-US" sz="800" dirty="0"/>
+              <a:t>0.25</a:t>
+            </a:r>
+            <a:endParaRPr lang="LID4096" sz="800" dirty="0"/>
+          </a:p>
+        </p:txBody>
+      </p:sp>
+      <p:sp>
+        <p:nvSpPr>
+          <p:cNvPr id="9" name="TextBox 8">
+            <a:extLst>
+              <a:ext uri="{FF2B5EF4-FFF2-40B4-BE49-F238E27FC236}">
+                <a16:creationId xmlns:a16="http://schemas.microsoft.com/office/drawing/2014/main" id="{5027FE4F-A220-18E0-DA7F-259A2CFC2304}"/>
+              </a:ext>
+            </a:extLst>
+          </p:cNvPr>
+          <p:cNvSpPr txBox="1"/>
+          <p:nvPr/>
+        </p:nvSpPr>
+        <p:spPr>
+          <a:xfrm>
+            <a:off x="2819419" y="3231332"/>
+            <a:ext cx="368210" cy="215444"/>
+          </a:xfrm>
+          <a:prstGeom prst="rect">
+            <a:avLst/>
+          </a:prstGeom>
+          <a:noFill/>
+        </p:spPr>
+        <p:txBody>
+          <a:bodyPr wrap="square" rtlCol="0">
+            <a:spAutoFit/>
+          </a:bodyPr>
+          <a:lstStyle/>
+          <a:p>
+            <a:r>
+              <a:rPr lang="en-US" sz="800" dirty="0"/>
+              <a:t>0.</a:t>
+            </a:r>
+            <a:r>
+              <a:rPr lang="sl-SI" sz="800" dirty="0"/>
+              <a:t>50</a:t>
+            </a:r>
+            <a:endParaRPr lang="LID4096" sz="800" dirty="0"/>
+          </a:p>
+        </p:txBody>
+      </p:sp>
+      <p:sp>
+        <p:nvSpPr>
+          <p:cNvPr id="26" name="TextBox 8">
+            <a:extLst>
+              <a:ext uri="{FF2B5EF4-FFF2-40B4-BE49-F238E27FC236}">
+                <a16:creationId xmlns:a16="http://schemas.microsoft.com/office/drawing/2014/main" id="{C057DC1C-E79A-C6B7-A432-77CBD78A3086}"/>
+              </a:ext>
+            </a:extLst>
+          </p:cNvPr>
+          <p:cNvSpPr txBox="1"/>
+          <p:nvPr/>
+        </p:nvSpPr>
+        <p:spPr>
+          <a:xfrm>
+            <a:off x="3195544" y="3231332"/>
+            <a:ext cx="368210" cy="215444"/>
+          </a:xfrm>
+          <a:prstGeom prst="rect">
+            <a:avLst/>
+          </a:prstGeom>
+          <a:noFill/>
+        </p:spPr>
+        <p:txBody>
+          <a:bodyPr wrap="square" rtlCol="0">
+            <a:spAutoFit/>
+          </a:bodyPr>
+          <a:lstStyle/>
+          <a:p>
+            <a:r>
+              <a:rPr lang="en-US" sz="800" dirty="0"/>
+              <a:t>0.25</a:t>
+            </a:r>
+            <a:endParaRPr lang="LID4096" sz="800" dirty="0"/>
+          </a:p>
+        </p:txBody>
+      </p:sp>
+      <p:sp>
+        <p:nvSpPr>
+          <p:cNvPr id="27" name="TextBox 8">
+            <a:extLst>
+              <a:ext uri="{FF2B5EF4-FFF2-40B4-BE49-F238E27FC236}">
+                <a16:creationId xmlns:a16="http://schemas.microsoft.com/office/drawing/2014/main" id="{0885F290-1D60-D025-3B79-1BCDF26EA17C}"/>
+              </a:ext>
+            </a:extLst>
+          </p:cNvPr>
+          <p:cNvSpPr txBox="1"/>
+          <p:nvPr/>
+        </p:nvSpPr>
+        <p:spPr>
+          <a:xfrm>
+            <a:off x="3555249" y="3227865"/>
+            <a:ext cx="368210" cy="215444"/>
+          </a:xfrm>
+          <a:prstGeom prst="rect">
+            <a:avLst/>
+          </a:prstGeom>
+          <a:noFill/>
+        </p:spPr>
+        <p:txBody>
+          <a:bodyPr wrap="square" rtlCol="0">
+            <a:spAutoFit/>
+          </a:bodyPr>
+          <a:lstStyle/>
+          <a:p>
+            <a:r>
+              <a:rPr lang="sl-SI" sz="800" dirty="0"/>
+              <a:t>13</a:t>
+            </a:r>
+            <a:endParaRPr lang="LID4096" sz="800" dirty="0"/>
+          </a:p>
+        </p:txBody>
+      </p:sp>
+      <p:sp>
+        <p:nvSpPr>
+          <p:cNvPr id="28" name="TextBox 8">
+            <a:extLst>
+              <a:ext uri="{FF2B5EF4-FFF2-40B4-BE49-F238E27FC236}">
+                <a16:creationId xmlns:a16="http://schemas.microsoft.com/office/drawing/2014/main" id="{DDCCF770-6276-378C-3671-875A14ACAA04}"/>
+              </a:ext>
+            </a:extLst>
+          </p:cNvPr>
+          <p:cNvSpPr txBox="1"/>
+          <p:nvPr/>
+        </p:nvSpPr>
+        <p:spPr>
+          <a:xfrm>
+            <a:off x="2111734" y="3611730"/>
+            <a:ext cx="368210" cy="215444"/>
+          </a:xfrm>
+          <a:prstGeom prst="rect">
+            <a:avLst/>
+          </a:prstGeom>
+          <a:noFill/>
+        </p:spPr>
+        <p:txBody>
+          <a:bodyPr wrap="square" rtlCol="0">
+            <a:spAutoFit/>
+          </a:bodyPr>
+          <a:lstStyle/>
+          <a:p>
+            <a:r>
+              <a:rPr lang="en-US" sz="800" dirty="0"/>
+              <a:t>0.25</a:t>
+            </a:r>
+            <a:endParaRPr lang="LID4096" sz="800" dirty="0"/>
+          </a:p>
+        </p:txBody>
+      </p:sp>
+      <p:sp>
+        <p:nvSpPr>
+          <p:cNvPr id="29" name="TextBox 8">
+            <a:extLst>
+              <a:ext uri="{FF2B5EF4-FFF2-40B4-BE49-F238E27FC236}">
+                <a16:creationId xmlns:a16="http://schemas.microsoft.com/office/drawing/2014/main" id="{AC1D07E2-F0FB-9AD7-A7EF-CFC470484796}"/>
+              </a:ext>
+            </a:extLst>
+          </p:cNvPr>
+          <p:cNvSpPr txBox="1"/>
+          <p:nvPr/>
+        </p:nvSpPr>
+        <p:spPr>
+          <a:xfrm>
+            <a:off x="2478629" y="3605386"/>
+            <a:ext cx="368210" cy="215444"/>
+          </a:xfrm>
+          <a:prstGeom prst="rect">
+            <a:avLst/>
+          </a:prstGeom>
+          <a:noFill/>
+        </p:spPr>
+        <p:txBody>
+          <a:bodyPr wrap="square" rtlCol="0">
+            <a:spAutoFit/>
+          </a:bodyPr>
+          <a:lstStyle/>
+          <a:p>
+            <a:r>
+              <a:rPr lang="en-US" sz="800" dirty="0"/>
+              <a:t>0.</a:t>
+            </a:r>
+            <a:r>
+              <a:rPr lang="sl-SI" sz="800" dirty="0"/>
+              <a:t>50</a:t>
+            </a:r>
+            <a:endParaRPr lang="LID4096" sz="800" dirty="0"/>
+          </a:p>
+        </p:txBody>
+      </p:sp>
+      <p:sp>
+        <p:nvSpPr>
+          <p:cNvPr id="30" name="TextBox 8">
+            <a:extLst>
+              <a:ext uri="{FF2B5EF4-FFF2-40B4-BE49-F238E27FC236}">
+                <a16:creationId xmlns:a16="http://schemas.microsoft.com/office/drawing/2014/main" id="{68A6843A-ED6A-AF01-6A21-F325F308724A}"/>
+              </a:ext>
+            </a:extLst>
+          </p:cNvPr>
+          <p:cNvSpPr txBox="1"/>
+          <p:nvPr/>
+        </p:nvSpPr>
+        <p:spPr>
+          <a:xfrm>
+            <a:off x="2828219" y="3599042"/>
+            <a:ext cx="368210" cy="215444"/>
+          </a:xfrm>
+          <a:prstGeom prst="rect">
+            <a:avLst/>
+          </a:prstGeom>
+          <a:noFill/>
+        </p:spPr>
+        <p:txBody>
+          <a:bodyPr wrap="square" rtlCol="0">
+            <a:spAutoFit/>
+          </a:bodyPr>
+          <a:lstStyle/>
+          <a:p>
+            <a:r>
+              <a:rPr lang="en-US" sz="800" dirty="0"/>
+              <a:t>0.</a:t>
+            </a:r>
+            <a:r>
+              <a:rPr lang="sl-SI" sz="800" dirty="0"/>
+              <a:t>75</a:t>
+            </a:r>
+            <a:endParaRPr lang="LID4096" sz="800" dirty="0"/>
+          </a:p>
+        </p:txBody>
+      </p:sp>
+      <p:sp>
+        <p:nvSpPr>
+          <p:cNvPr id="36" name="TextBox 8">
+            <a:extLst>
+              <a:ext uri="{FF2B5EF4-FFF2-40B4-BE49-F238E27FC236}">
+                <a16:creationId xmlns:a16="http://schemas.microsoft.com/office/drawing/2014/main" id="{5C9D5CCE-B78A-AF69-1064-F6FB5A6AE2BA}"/>
+              </a:ext>
+            </a:extLst>
+          </p:cNvPr>
+          <p:cNvSpPr txBox="1"/>
+          <p:nvPr/>
+        </p:nvSpPr>
+        <p:spPr>
+          <a:xfrm>
+            <a:off x="3204344" y="3599042"/>
+            <a:ext cx="368210" cy="215444"/>
+          </a:xfrm>
+          <a:prstGeom prst="rect">
+            <a:avLst/>
+          </a:prstGeom>
+          <a:noFill/>
+        </p:spPr>
+        <p:txBody>
+          <a:bodyPr wrap="square" rtlCol="0">
+            <a:spAutoFit/>
+          </a:bodyPr>
+          <a:lstStyle/>
+          <a:p>
+            <a:r>
+              <a:rPr lang="en-US" sz="800" dirty="0"/>
+              <a:t>0.5</a:t>
+            </a:r>
+            <a:r>
+              <a:rPr lang="sl-SI" sz="800" dirty="0"/>
+              <a:t>0</a:t>
+            </a:r>
+            <a:endParaRPr lang="LID4096" sz="800" dirty="0"/>
+          </a:p>
+        </p:txBody>
+      </p:sp>
+      <p:sp>
+        <p:nvSpPr>
+          <p:cNvPr id="37" name="TextBox 8">
+            <a:extLst>
+              <a:ext uri="{FF2B5EF4-FFF2-40B4-BE49-F238E27FC236}">
+                <a16:creationId xmlns:a16="http://schemas.microsoft.com/office/drawing/2014/main" id="{3A8B8312-09E7-B698-C8DC-A63B11992797}"/>
+              </a:ext>
+            </a:extLst>
+          </p:cNvPr>
+          <p:cNvSpPr txBox="1"/>
+          <p:nvPr/>
+        </p:nvSpPr>
+        <p:spPr>
+          <a:xfrm>
+            <a:off x="3564049" y="3595575"/>
+            <a:ext cx="368210" cy="215444"/>
+          </a:xfrm>
+          <a:prstGeom prst="rect">
+            <a:avLst/>
+          </a:prstGeom>
+          <a:noFill/>
+        </p:spPr>
+        <p:txBody>
+          <a:bodyPr wrap="square" rtlCol="0">
+            <a:spAutoFit/>
+          </a:bodyPr>
+          <a:lstStyle/>
+          <a:p>
+            <a:r>
+              <a:rPr lang="en-US" sz="800" dirty="0"/>
+              <a:t>0.25</a:t>
+            </a:r>
+            <a:endParaRPr lang="LID4096" sz="800" dirty="0"/>
+          </a:p>
+        </p:txBody>
+      </p:sp>
+      <p:sp>
+        <p:nvSpPr>
+          <p:cNvPr id="38" name="TextBox 8">
+            <a:extLst>
+              <a:ext uri="{FF2B5EF4-FFF2-40B4-BE49-F238E27FC236}">
+                <a16:creationId xmlns:a16="http://schemas.microsoft.com/office/drawing/2014/main" id="{6CB4DF0C-E155-E405-E147-BD8A7BE04129}"/>
+              </a:ext>
+            </a:extLst>
+          </p:cNvPr>
+          <p:cNvSpPr txBox="1"/>
+          <p:nvPr/>
+        </p:nvSpPr>
+        <p:spPr>
+          <a:xfrm>
+            <a:off x="2100009" y="3974200"/>
+            <a:ext cx="368210" cy="215444"/>
+          </a:xfrm>
+          <a:prstGeom prst="rect">
+            <a:avLst/>
+          </a:prstGeom>
+          <a:noFill/>
+        </p:spPr>
+        <p:txBody>
+          <a:bodyPr wrap="square" rtlCol="0">
+            <a:spAutoFit/>
+          </a:bodyPr>
+          <a:lstStyle/>
+          <a:p>
+            <a:r>
+              <a:rPr lang="en-US" sz="800" dirty="0"/>
+              <a:t>0.5</a:t>
+            </a:r>
+            <a:r>
+              <a:rPr lang="sl-SI" sz="800" dirty="0"/>
+              <a:t>0</a:t>
+            </a:r>
+            <a:endParaRPr lang="LID4096" sz="800" dirty="0"/>
+          </a:p>
+        </p:txBody>
+      </p:sp>
+      <p:sp>
+        <p:nvSpPr>
+          <p:cNvPr id="39" name="TextBox 8">
+            <a:extLst>
+              <a:ext uri="{FF2B5EF4-FFF2-40B4-BE49-F238E27FC236}">
+                <a16:creationId xmlns:a16="http://schemas.microsoft.com/office/drawing/2014/main" id="{07B47C24-1165-E219-16DF-844157E8E39D}"/>
+              </a:ext>
+            </a:extLst>
+          </p:cNvPr>
+          <p:cNvSpPr txBox="1"/>
+          <p:nvPr/>
+        </p:nvSpPr>
+        <p:spPr>
+          <a:xfrm>
+            <a:off x="2466904" y="3967856"/>
+            <a:ext cx="368210" cy="215444"/>
+          </a:xfrm>
+          <a:prstGeom prst="rect">
+            <a:avLst/>
+          </a:prstGeom>
+          <a:noFill/>
+        </p:spPr>
+        <p:txBody>
+          <a:bodyPr wrap="square" rtlCol="0">
+            <a:spAutoFit/>
+          </a:bodyPr>
+          <a:lstStyle/>
+          <a:p>
+            <a:r>
+              <a:rPr lang="en-US" sz="800" dirty="0"/>
+              <a:t>0.</a:t>
+            </a:r>
+            <a:r>
+              <a:rPr lang="sl-SI" sz="800" dirty="0"/>
+              <a:t>75</a:t>
+            </a:r>
+            <a:endParaRPr lang="LID4096" sz="800" dirty="0"/>
+          </a:p>
+        </p:txBody>
+      </p:sp>
+      <p:sp>
+        <p:nvSpPr>
+          <p:cNvPr id="40" name="TextBox 8">
+            <a:extLst>
+              <a:ext uri="{FF2B5EF4-FFF2-40B4-BE49-F238E27FC236}">
+                <a16:creationId xmlns:a16="http://schemas.microsoft.com/office/drawing/2014/main" id="{B7C4439A-1D56-2018-A09E-3154C855E349}"/>
+              </a:ext>
+            </a:extLst>
+          </p:cNvPr>
+          <p:cNvSpPr txBox="1"/>
+          <p:nvPr/>
+        </p:nvSpPr>
+        <p:spPr>
+          <a:xfrm>
+            <a:off x="2816494" y="3961512"/>
+            <a:ext cx="368210" cy="215444"/>
+          </a:xfrm>
+          <a:prstGeom prst="rect">
+            <a:avLst/>
+          </a:prstGeom>
+          <a:noFill/>
+        </p:spPr>
+        <p:txBody>
+          <a:bodyPr wrap="square" rtlCol="0">
+            <a:spAutoFit/>
+          </a:bodyPr>
+          <a:lstStyle/>
+          <a:p>
+            <a:r>
+              <a:rPr lang="sl-SI" sz="800" dirty="0"/>
+              <a:t>1.00</a:t>
+            </a:r>
+            <a:endParaRPr lang="LID4096" sz="800" dirty="0"/>
+          </a:p>
+        </p:txBody>
+      </p:sp>
+      <p:sp>
+        <p:nvSpPr>
+          <p:cNvPr id="41" name="TextBox 8">
+            <a:extLst>
+              <a:ext uri="{FF2B5EF4-FFF2-40B4-BE49-F238E27FC236}">
+                <a16:creationId xmlns:a16="http://schemas.microsoft.com/office/drawing/2014/main" id="{D567D61F-0767-C3F0-08BE-4D17B96B3A27}"/>
+              </a:ext>
+            </a:extLst>
+          </p:cNvPr>
+          <p:cNvSpPr txBox="1"/>
+          <p:nvPr/>
+        </p:nvSpPr>
+        <p:spPr>
+          <a:xfrm>
+            <a:off x="3192619" y="3961512"/>
+            <a:ext cx="368210" cy="215444"/>
+          </a:xfrm>
+          <a:prstGeom prst="rect">
+            <a:avLst/>
+          </a:prstGeom>
+          <a:noFill/>
+        </p:spPr>
+        <p:txBody>
+          <a:bodyPr wrap="square" rtlCol="0">
+            <a:spAutoFit/>
+          </a:bodyPr>
+          <a:lstStyle/>
+          <a:p>
+            <a:r>
+              <a:rPr lang="sl-SI" sz="800" dirty="0"/>
+              <a:t>0.75</a:t>
+            </a:r>
+            <a:endParaRPr lang="LID4096" sz="800" dirty="0"/>
+          </a:p>
+        </p:txBody>
+      </p:sp>
+      <p:sp>
+        <p:nvSpPr>
+          <p:cNvPr id="42" name="TextBox 8">
+            <a:extLst>
+              <a:ext uri="{FF2B5EF4-FFF2-40B4-BE49-F238E27FC236}">
+                <a16:creationId xmlns:a16="http://schemas.microsoft.com/office/drawing/2014/main" id="{C88D746B-FDE8-CE7E-6903-D9E07387A21A}"/>
+              </a:ext>
+            </a:extLst>
+          </p:cNvPr>
+          <p:cNvSpPr txBox="1"/>
+          <p:nvPr/>
+        </p:nvSpPr>
+        <p:spPr>
+          <a:xfrm>
+            <a:off x="3552324" y="3958045"/>
+            <a:ext cx="368210" cy="215444"/>
+          </a:xfrm>
+          <a:prstGeom prst="rect">
+            <a:avLst/>
+          </a:prstGeom>
+          <a:noFill/>
+        </p:spPr>
+        <p:txBody>
+          <a:bodyPr wrap="square" rtlCol="0">
+            <a:spAutoFit/>
+          </a:bodyPr>
+          <a:lstStyle/>
+          <a:p>
+            <a:r>
+              <a:rPr lang="sl-SI" sz="800" dirty="0"/>
+              <a:t>0.50</a:t>
+            </a:r>
+            <a:endParaRPr lang="LID4096" sz="800" dirty="0"/>
+          </a:p>
+        </p:txBody>
+      </p:sp>
+      <p:sp>
+        <p:nvSpPr>
+          <p:cNvPr id="43" name="TextBox 8">
+            <a:extLst>
+              <a:ext uri="{FF2B5EF4-FFF2-40B4-BE49-F238E27FC236}">
+                <a16:creationId xmlns:a16="http://schemas.microsoft.com/office/drawing/2014/main" id="{A63D3C7E-417C-1324-A2E1-561E2DF4DBA8}"/>
+              </a:ext>
+            </a:extLst>
+          </p:cNvPr>
+          <p:cNvSpPr txBox="1"/>
+          <p:nvPr/>
+        </p:nvSpPr>
+        <p:spPr>
+          <a:xfrm>
+            <a:off x="2111734" y="4345766"/>
+            <a:ext cx="368210" cy="215444"/>
+          </a:xfrm>
+          <a:prstGeom prst="rect">
+            <a:avLst/>
+          </a:prstGeom>
+          <a:noFill/>
+        </p:spPr>
+        <p:txBody>
+          <a:bodyPr wrap="square" rtlCol="0">
+            <a:spAutoFit/>
+          </a:bodyPr>
+          <a:lstStyle/>
+          <a:p>
+            <a:r>
+              <a:rPr lang="en-US" sz="800" dirty="0"/>
+              <a:t>0.25</a:t>
+            </a:r>
+            <a:endParaRPr lang="LID4096" sz="800" dirty="0"/>
+          </a:p>
+        </p:txBody>
+      </p:sp>
+      <p:sp>
+        <p:nvSpPr>
+          <p:cNvPr id="44" name="TextBox 8">
+            <a:extLst>
+              <a:ext uri="{FF2B5EF4-FFF2-40B4-BE49-F238E27FC236}">
+                <a16:creationId xmlns:a16="http://schemas.microsoft.com/office/drawing/2014/main" id="{F92FC4A4-5C98-AFA2-EA2C-185290FCDECA}"/>
+              </a:ext>
+            </a:extLst>
+          </p:cNvPr>
+          <p:cNvSpPr txBox="1"/>
+          <p:nvPr/>
+        </p:nvSpPr>
+        <p:spPr>
+          <a:xfrm>
+            <a:off x="2478629" y="4339422"/>
+            <a:ext cx="368210" cy="215444"/>
+          </a:xfrm>
+          <a:prstGeom prst="rect">
+            <a:avLst/>
+          </a:prstGeom>
+          <a:noFill/>
+        </p:spPr>
+        <p:txBody>
+          <a:bodyPr wrap="square" rtlCol="0">
+            <a:spAutoFit/>
+          </a:bodyPr>
+          <a:lstStyle/>
+          <a:p>
+            <a:r>
+              <a:rPr lang="en-US" sz="800" dirty="0"/>
+              <a:t>0.</a:t>
+            </a:r>
+            <a:r>
+              <a:rPr lang="sl-SI" sz="800" dirty="0"/>
+              <a:t>50</a:t>
+            </a:r>
+            <a:endParaRPr lang="LID4096" sz="800" dirty="0"/>
+          </a:p>
+        </p:txBody>
+      </p:sp>
+      <p:sp>
+        <p:nvSpPr>
+          <p:cNvPr id="45" name="TextBox 8">
+            <a:extLst>
+              <a:ext uri="{FF2B5EF4-FFF2-40B4-BE49-F238E27FC236}">
+                <a16:creationId xmlns:a16="http://schemas.microsoft.com/office/drawing/2014/main" id="{6E78512E-2840-B58B-74CB-40E43C2D49E2}"/>
+              </a:ext>
+            </a:extLst>
+          </p:cNvPr>
+          <p:cNvSpPr txBox="1"/>
+          <p:nvPr/>
+        </p:nvSpPr>
+        <p:spPr>
+          <a:xfrm>
+            <a:off x="2828219" y="4333078"/>
+            <a:ext cx="368210" cy="215444"/>
+          </a:xfrm>
+          <a:prstGeom prst="rect">
+            <a:avLst/>
+          </a:prstGeom>
+          <a:noFill/>
+        </p:spPr>
+        <p:txBody>
+          <a:bodyPr wrap="square" rtlCol="0">
+            <a:spAutoFit/>
+          </a:bodyPr>
+          <a:lstStyle/>
+          <a:p>
+            <a:r>
+              <a:rPr lang="sl-SI" sz="800" dirty="0"/>
+              <a:t>0.75</a:t>
+            </a:r>
+            <a:endParaRPr lang="LID4096" sz="800" dirty="0"/>
+          </a:p>
+        </p:txBody>
+      </p:sp>
+      <p:sp>
+        <p:nvSpPr>
+          <p:cNvPr id="46" name="TextBox 8">
+            <a:extLst>
+              <a:ext uri="{FF2B5EF4-FFF2-40B4-BE49-F238E27FC236}">
+                <a16:creationId xmlns:a16="http://schemas.microsoft.com/office/drawing/2014/main" id="{029DA2C5-4FE3-052F-2FDC-0B4E56EBE02B}"/>
+              </a:ext>
+            </a:extLst>
+          </p:cNvPr>
+          <p:cNvSpPr txBox="1"/>
+          <p:nvPr/>
+        </p:nvSpPr>
+        <p:spPr>
+          <a:xfrm>
+            <a:off x="3204344" y="4333078"/>
+            <a:ext cx="368210" cy="215444"/>
+          </a:xfrm>
+          <a:prstGeom prst="rect">
+            <a:avLst/>
+          </a:prstGeom>
+          <a:noFill/>
+        </p:spPr>
+        <p:txBody>
+          <a:bodyPr wrap="square" rtlCol="0">
+            <a:spAutoFit/>
+          </a:bodyPr>
+          <a:lstStyle/>
+          <a:p>
+            <a:r>
+              <a:rPr lang="en-US" sz="800" dirty="0"/>
+              <a:t>0.</a:t>
+            </a:r>
+            <a:r>
+              <a:rPr lang="sl-SI" sz="800" dirty="0"/>
+              <a:t>50</a:t>
+            </a:r>
+            <a:endParaRPr lang="LID4096" sz="800" dirty="0"/>
+          </a:p>
+        </p:txBody>
+      </p:sp>
+      <p:sp>
+        <p:nvSpPr>
+          <p:cNvPr id="47" name="TextBox 8">
+            <a:extLst>
+              <a:ext uri="{FF2B5EF4-FFF2-40B4-BE49-F238E27FC236}">
+                <a16:creationId xmlns:a16="http://schemas.microsoft.com/office/drawing/2014/main" id="{FE99C44C-76A7-F7FB-91CA-79A28CEAFBCD}"/>
+              </a:ext>
+            </a:extLst>
+          </p:cNvPr>
+          <p:cNvSpPr txBox="1"/>
+          <p:nvPr/>
+        </p:nvSpPr>
+        <p:spPr>
+          <a:xfrm>
+            <a:off x="3564049" y="4329611"/>
+            <a:ext cx="368210" cy="215444"/>
+          </a:xfrm>
+          <a:prstGeom prst="rect">
+            <a:avLst/>
+          </a:prstGeom>
+          <a:noFill/>
+        </p:spPr>
+        <p:txBody>
+          <a:bodyPr wrap="square" rtlCol="0">
+            <a:spAutoFit/>
+          </a:bodyPr>
+          <a:lstStyle/>
+          <a:p>
+            <a:r>
+              <a:rPr lang="en-US" sz="800" dirty="0"/>
+              <a:t>0.25</a:t>
+            </a:r>
+            <a:endParaRPr lang="LID4096" sz="800" dirty="0"/>
+          </a:p>
+        </p:txBody>
+      </p:sp>
+      <p:sp>
+        <p:nvSpPr>
+          <p:cNvPr id="48" name="TextBox 8">
+            <a:extLst>
+              <a:ext uri="{FF2B5EF4-FFF2-40B4-BE49-F238E27FC236}">
+                <a16:creationId xmlns:a16="http://schemas.microsoft.com/office/drawing/2014/main" id="{AAA8FB23-5D9E-1E11-91CD-18671AF71134}"/>
+              </a:ext>
+            </a:extLst>
+          </p:cNvPr>
+          <p:cNvSpPr txBox="1"/>
+          <p:nvPr/>
+        </p:nvSpPr>
+        <p:spPr>
+          <a:xfrm>
+            <a:off x="2099714" y="4694541"/>
+            <a:ext cx="368210" cy="215444"/>
+          </a:xfrm>
+          <a:prstGeom prst="rect">
+            <a:avLst/>
+          </a:prstGeom>
+          <a:noFill/>
+        </p:spPr>
+        <p:txBody>
+          <a:bodyPr wrap="square" rtlCol="0">
+            <a:spAutoFit/>
+          </a:bodyPr>
+          <a:lstStyle/>
+          <a:p>
+            <a:r>
+              <a:rPr lang="en-US" sz="800" dirty="0"/>
+              <a:t>0.</a:t>
+            </a:r>
+            <a:r>
+              <a:rPr lang="sl-SI" sz="800" dirty="0"/>
+              <a:t>13</a:t>
+            </a:r>
+            <a:endParaRPr lang="LID4096" sz="800" dirty="0"/>
+          </a:p>
+        </p:txBody>
+      </p:sp>
+      <p:sp>
+        <p:nvSpPr>
+          <p:cNvPr id="49" name="TextBox 8">
+            <a:extLst>
+              <a:ext uri="{FF2B5EF4-FFF2-40B4-BE49-F238E27FC236}">
+                <a16:creationId xmlns:a16="http://schemas.microsoft.com/office/drawing/2014/main" id="{19EFD26A-5ABA-7792-5534-218736C3F03B}"/>
+              </a:ext>
+            </a:extLst>
+          </p:cNvPr>
+          <p:cNvSpPr txBox="1"/>
+          <p:nvPr/>
+        </p:nvSpPr>
+        <p:spPr>
+          <a:xfrm>
+            <a:off x="2466609" y="4688197"/>
+            <a:ext cx="368210" cy="215444"/>
+          </a:xfrm>
+          <a:prstGeom prst="rect">
+            <a:avLst/>
+          </a:prstGeom>
+          <a:noFill/>
+        </p:spPr>
+        <p:txBody>
+          <a:bodyPr wrap="square" rtlCol="0">
+            <a:spAutoFit/>
+          </a:bodyPr>
+          <a:lstStyle/>
+          <a:p>
+            <a:r>
+              <a:rPr lang="en-US" sz="800" dirty="0"/>
+              <a:t>0.25</a:t>
+            </a:r>
+            <a:endParaRPr lang="LID4096" sz="800" dirty="0"/>
+          </a:p>
+        </p:txBody>
+      </p:sp>
+      <p:sp>
+        <p:nvSpPr>
+          <p:cNvPr id="50" name="TextBox 8">
+            <a:extLst>
+              <a:ext uri="{FF2B5EF4-FFF2-40B4-BE49-F238E27FC236}">
+                <a16:creationId xmlns:a16="http://schemas.microsoft.com/office/drawing/2014/main" id="{0B70ADBF-74F4-F7D3-03F1-3F1E9C7AB684}"/>
+              </a:ext>
+            </a:extLst>
+          </p:cNvPr>
+          <p:cNvSpPr txBox="1"/>
+          <p:nvPr/>
+        </p:nvSpPr>
+        <p:spPr>
+          <a:xfrm>
+            <a:off x="2816199" y="4681853"/>
+            <a:ext cx="368210" cy="215444"/>
+          </a:xfrm>
+          <a:prstGeom prst="rect">
+            <a:avLst/>
+          </a:prstGeom>
+          <a:noFill/>
+        </p:spPr>
+        <p:txBody>
+          <a:bodyPr wrap="square" rtlCol="0">
+            <a:spAutoFit/>
+          </a:bodyPr>
+          <a:lstStyle/>
+          <a:p>
+            <a:r>
+              <a:rPr lang="en-US" sz="800" dirty="0"/>
+              <a:t>0.</a:t>
+            </a:r>
+            <a:r>
+              <a:rPr lang="sl-SI" sz="800" dirty="0"/>
+              <a:t>50</a:t>
+            </a:r>
+            <a:endParaRPr lang="LID4096" sz="800" dirty="0"/>
+          </a:p>
+        </p:txBody>
+      </p:sp>
+      <p:sp>
+        <p:nvSpPr>
+          <p:cNvPr id="51" name="TextBox 8">
+            <a:extLst>
+              <a:ext uri="{FF2B5EF4-FFF2-40B4-BE49-F238E27FC236}">
+                <a16:creationId xmlns:a16="http://schemas.microsoft.com/office/drawing/2014/main" id="{AD11943F-4CFF-6F19-5279-7E57EBD691CC}"/>
+              </a:ext>
+            </a:extLst>
+          </p:cNvPr>
+          <p:cNvSpPr txBox="1"/>
+          <p:nvPr/>
+        </p:nvSpPr>
+        <p:spPr>
+          <a:xfrm>
+            <a:off x="3192324" y="4681853"/>
+            <a:ext cx="368210" cy="215444"/>
+          </a:xfrm>
+          <a:prstGeom prst="rect">
+            <a:avLst/>
+          </a:prstGeom>
+          <a:noFill/>
+        </p:spPr>
+        <p:txBody>
+          <a:bodyPr wrap="square" rtlCol="0">
+            <a:spAutoFit/>
+          </a:bodyPr>
+          <a:lstStyle/>
+          <a:p>
+            <a:r>
+              <a:rPr lang="en-US" sz="800" dirty="0"/>
+              <a:t>0.25</a:t>
+            </a:r>
+            <a:endParaRPr lang="LID4096" sz="800" dirty="0"/>
+          </a:p>
+        </p:txBody>
+      </p:sp>
+      <p:sp>
+        <p:nvSpPr>
+          <p:cNvPr id="52" name="TextBox 8">
+            <a:extLst>
+              <a:ext uri="{FF2B5EF4-FFF2-40B4-BE49-F238E27FC236}">
+                <a16:creationId xmlns:a16="http://schemas.microsoft.com/office/drawing/2014/main" id="{6CB4F4E9-6889-6604-6338-37809BB4D063}"/>
+              </a:ext>
+            </a:extLst>
+          </p:cNvPr>
+          <p:cNvSpPr txBox="1"/>
+          <p:nvPr/>
+        </p:nvSpPr>
+        <p:spPr>
+          <a:xfrm>
+            <a:off x="3552029" y="4678386"/>
+            <a:ext cx="368210" cy="215444"/>
+          </a:xfrm>
+          <a:prstGeom prst="rect">
+            <a:avLst/>
+          </a:prstGeom>
+          <a:noFill/>
+        </p:spPr>
+        <p:txBody>
+          <a:bodyPr wrap="square" rtlCol="0">
+            <a:spAutoFit/>
+          </a:bodyPr>
+          <a:lstStyle/>
+          <a:p>
+            <a:r>
+              <a:rPr lang="en-US" sz="800" dirty="0"/>
+              <a:t>0.</a:t>
+            </a:r>
+            <a:r>
+              <a:rPr lang="sl-SI" sz="800" dirty="0"/>
+              <a:t>13</a:t>
+            </a:r>
+            <a:endParaRPr lang="LID4096" sz="800" dirty="0"/>
+          </a:p>
+        </p:txBody>
+      </p:sp>
+      <p:cxnSp>
+        <p:nvCxnSpPr>
+          <p:cNvPr id="165" name="Raven puščični povezovalnik 164">
+            <a:extLst>
+              <a:ext uri="{FF2B5EF4-FFF2-40B4-BE49-F238E27FC236}">
+                <a16:creationId xmlns:a16="http://schemas.microsoft.com/office/drawing/2014/main" id="{CA88DF6C-D735-A20D-47FC-7C0A11E70281}"/>
+              </a:ext>
+            </a:extLst>
+          </p:cNvPr>
+          <p:cNvCxnSpPr>
+            <a:cxnSpLocks/>
+          </p:cNvCxnSpPr>
+          <p:nvPr/>
+        </p:nvCxnSpPr>
+        <p:spPr>
+          <a:xfrm>
+            <a:off x="611546" y="3794700"/>
+            <a:ext cx="1067481" cy="1060525"/>
+          </a:xfrm>
+          <a:prstGeom prst="straightConnector1">
+            <a:avLst/>
+          </a:prstGeom>
+          <a:ln w="9525">
+            <a:solidFill>
+              <a:schemeClr val="tx1"/>
+            </a:solidFill>
+            <a:tailEnd type="triangle"/>
+          </a:ln>
+        </p:spPr>
+        <p:style>
+          <a:lnRef idx="1">
+            <a:schemeClr val="accent1"/>
+          </a:lnRef>
+          <a:fillRef idx="0">
+            <a:schemeClr val="accent1"/>
+          </a:fillRef>
+          <a:effectRef idx="0">
+            <a:schemeClr val="accent1"/>
+          </a:effectRef>
+          <a:fontRef idx="minor">
+            <a:schemeClr val="tx1"/>
+          </a:fontRef>
+        </p:style>
+      </p:cxnSp>
+      <p:cxnSp>
+        <p:nvCxnSpPr>
+          <p:cNvPr id="168" name="Raven puščični povezovalnik 167">
+            <a:extLst>
+              <a:ext uri="{FF2B5EF4-FFF2-40B4-BE49-F238E27FC236}">
+                <a16:creationId xmlns:a16="http://schemas.microsoft.com/office/drawing/2014/main" id="{8C361DCF-2791-1F97-A02B-FA8FDA83E6B9}"/>
+              </a:ext>
+            </a:extLst>
+          </p:cNvPr>
+          <p:cNvCxnSpPr>
+            <a:cxnSpLocks/>
+          </p:cNvCxnSpPr>
+          <p:nvPr/>
+        </p:nvCxnSpPr>
+        <p:spPr>
+          <a:xfrm>
+            <a:off x="2201988" y="5139690"/>
+            <a:ext cx="1585299" cy="0"/>
+          </a:xfrm>
+          <a:prstGeom prst="straightConnector1">
+            <a:avLst/>
+          </a:prstGeom>
+          <a:ln w="9525">
+            <a:solidFill>
+              <a:schemeClr val="tx1"/>
+            </a:solidFill>
+            <a:tailEnd type="triangle"/>
+          </a:ln>
+        </p:spPr>
+        <p:style>
+          <a:lnRef idx="1">
+            <a:schemeClr val="accent1"/>
+          </a:lnRef>
+          <a:fillRef idx="0">
+            <a:schemeClr val="accent1"/>
+          </a:fillRef>
+          <a:effectRef idx="0">
+            <a:schemeClr val="accent1"/>
+          </a:effectRef>
+          <a:fontRef idx="minor">
+            <a:schemeClr val="tx1"/>
+          </a:fontRef>
+        </p:style>
+      </p:cxnSp>
+      <p:cxnSp>
+        <p:nvCxnSpPr>
+          <p:cNvPr id="170" name="Raven puščični povezovalnik 169">
+            <a:extLst>
+              <a:ext uri="{FF2B5EF4-FFF2-40B4-BE49-F238E27FC236}">
+                <a16:creationId xmlns:a16="http://schemas.microsoft.com/office/drawing/2014/main" id="{4FB197CE-19EE-6FAF-07F2-41529A8C4977}"/>
+              </a:ext>
+            </a:extLst>
+          </p:cNvPr>
+          <p:cNvCxnSpPr>
+            <a:cxnSpLocks/>
+          </p:cNvCxnSpPr>
+          <p:nvPr/>
+        </p:nvCxnSpPr>
+        <p:spPr>
+          <a:xfrm rot="16200000">
+            <a:off x="3268790" y="4079218"/>
+            <a:ext cx="1585299" cy="0"/>
+          </a:xfrm>
+          <a:prstGeom prst="straightConnector1">
+            <a:avLst/>
+          </a:prstGeom>
+          <a:ln w="9525">
+            <a:solidFill>
+              <a:schemeClr val="tx1"/>
+            </a:solidFill>
+            <a:tailEnd type="triangle"/>
+          </a:ln>
+        </p:spPr>
+        <p:style>
+          <a:lnRef idx="1">
+            <a:schemeClr val="accent1"/>
+          </a:lnRef>
+          <a:fillRef idx="0">
+            <a:schemeClr val="accent1"/>
+          </a:fillRef>
+          <a:effectRef idx="0">
+            <a:schemeClr val="accent1"/>
+          </a:effectRef>
+          <a:fontRef idx="minor">
+            <a:schemeClr val="tx1"/>
+          </a:fontRef>
+        </p:style>
+      </p:cxnSp>
+      <p:sp>
+        <p:nvSpPr>
+          <p:cNvPr id="171" name="PoljeZBesedilom 170">
+            <a:extLst>
+              <a:ext uri="{FF2B5EF4-FFF2-40B4-BE49-F238E27FC236}">
+                <a16:creationId xmlns:a16="http://schemas.microsoft.com/office/drawing/2014/main" id="{A61F4B6A-DE09-2E35-4380-9AABADC77466}"/>
+              </a:ext>
+            </a:extLst>
+          </p:cNvPr>
+          <p:cNvSpPr txBox="1"/>
+          <p:nvPr/>
+        </p:nvSpPr>
+        <p:spPr>
+          <a:xfrm rot="5400000">
+            <a:off x="3423841" y="4338256"/>
+            <a:ext cx="1524000" cy="307777"/>
+          </a:xfrm>
+          <a:prstGeom prst="rect">
+            <a:avLst/>
+          </a:prstGeom>
+          <a:noFill/>
+        </p:spPr>
+        <p:txBody>
+          <a:bodyPr wrap="square" rtlCol="0">
+            <a:spAutoFit/>
+          </a:bodyPr>
+          <a:lstStyle/>
+          <a:p>
+            <a:r>
+              <a:rPr lang="sl-SI" sz="1400" dirty="0"/>
+              <a:t>height</a:t>
+            </a:r>
+          </a:p>
+        </p:txBody>
+      </p:sp>
+      <p:sp>
+        <p:nvSpPr>
+          <p:cNvPr id="172" name="PoljeZBesedilom 171">
+            <a:extLst>
+              <a:ext uri="{FF2B5EF4-FFF2-40B4-BE49-F238E27FC236}">
+                <a16:creationId xmlns:a16="http://schemas.microsoft.com/office/drawing/2014/main" id="{62910C81-F3A9-2707-C6EB-B506E36E798F}"/>
+              </a:ext>
+            </a:extLst>
+          </p:cNvPr>
+          <p:cNvSpPr txBox="1"/>
+          <p:nvPr/>
+        </p:nvSpPr>
+        <p:spPr>
+          <a:xfrm>
+            <a:off x="2722537" y="5142090"/>
+            <a:ext cx="1524000" cy="307777"/>
+          </a:xfrm>
+          <a:prstGeom prst="rect">
+            <a:avLst/>
+          </a:prstGeom>
+          <a:noFill/>
+        </p:spPr>
+        <p:txBody>
+          <a:bodyPr wrap="square" rtlCol="0">
+            <a:spAutoFit/>
+          </a:bodyPr>
+          <a:lstStyle/>
+          <a:p>
+            <a:r>
+              <a:rPr lang="sl-SI" sz="1400" dirty="0"/>
+              <a:t>width</a:t>
+            </a:r>
+          </a:p>
+        </p:txBody>
+      </p:sp>
+      <p:sp>
+        <p:nvSpPr>
+          <p:cNvPr id="173" name="PoljeZBesedilom 172">
+            <a:extLst>
+              <a:ext uri="{FF2B5EF4-FFF2-40B4-BE49-F238E27FC236}">
+                <a16:creationId xmlns:a16="http://schemas.microsoft.com/office/drawing/2014/main" id="{7A86DBFF-3479-D62F-31BF-34364A26D1E0}"/>
+              </a:ext>
+            </a:extLst>
+          </p:cNvPr>
+          <p:cNvSpPr txBox="1"/>
+          <p:nvPr/>
+        </p:nvSpPr>
+        <p:spPr>
+          <a:xfrm rot="2690782">
+            <a:off x="272014" y="4218903"/>
+            <a:ext cx="1524000" cy="307777"/>
+          </a:xfrm>
+          <a:prstGeom prst="rect">
+            <a:avLst/>
+          </a:prstGeom>
+          <a:noFill/>
+        </p:spPr>
+        <p:txBody>
+          <a:bodyPr wrap="square" rtlCol="0">
+            <a:spAutoFit/>
+          </a:bodyPr>
+          <a:lstStyle/>
+          <a:p>
+            <a:r>
+              <a:rPr lang="sl-SI" sz="1400" dirty="0"/>
+              <a:t>length – main axis</a:t>
+            </a:r>
           </a:p>
         </p:txBody>
       </p:sp>

</xml_diff>

<commit_message>
ERK main axis colored
</commit_message>
<xml_diff>
--- a/Articles/ERK/schemes.pptx
+++ b/Articles/ERK/schemes.pptx
@@ -3585,9 +3585,9 @@
             <a:avLst/>
           </a:prstGeom>
           <a:solidFill>
-            <a:schemeClr val="accent6">
-              <a:alpha val="20000"/>
-            </a:schemeClr>
+            <a:srgbClr val="4472C4">
+              <a:alpha val="50000"/>
+            </a:srgbClr>
           </a:solidFill>
           <a:ln>
             <a:solidFill>
@@ -3677,9 +3677,9 @@
             <a:avLst/>
           </a:prstGeom>
           <a:solidFill>
-            <a:schemeClr val="accent6">
-              <a:alpha val="40000"/>
-            </a:schemeClr>
+            <a:srgbClr val="235888">
+              <a:alpha val="50000"/>
+            </a:srgbClr>
           </a:solidFill>
           <a:ln>
             <a:solidFill>
@@ -3769,9 +3769,9 @@
             <a:avLst/>
           </a:prstGeom>
           <a:solidFill>
-            <a:schemeClr val="accent6">
-              <a:alpha val="60000"/>
-            </a:schemeClr>
+            <a:srgbClr val="2C70AE">
+              <a:alpha val="75000"/>
+            </a:srgbClr>
           </a:solidFill>
           <a:ln>
             <a:solidFill>
@@ -3861,9 +3861,9 @@
             <a:avLst/>
           </a:prstGeom>
           <a:solidFill>
-            <a:schemeClr val="accent6">
-              <a:alpha val="75000"/>
-            </a:schemeClr>
+            <a:srgbClr val="BA7741">
+              <a:alpha val="50000"/>
+            </a:srgbClr>
           </a:solidFill>
           <a:ln>
             <a:solidFill>
@@ -3953,9 +3953,9 @@
             <a:avLst/>
           </a:prstGeom>
           <a:solidFill>
-            <a:schemeClr val="accent6">
-              <a:alpha val="60000"/>
-            </a:schemeClr>
+            <a:srgbClr val="E08F4E">
+              <a:alpha val="50000"/>
+            </a:srgbClr>
           </a:solidFill>
           <a:ln>
             <a:solidFill>
@@ -4045,9 +4045,9 @@
             <a:avLst/>
           </a:prstGeom>
           <a:solidFill>
-            <a:schemeClr val="accent6">
-              <a:alpha val="40000"/>
-            </a:schemeClr>
+            <a:srgbClr val="FFB858">
+              <a:alpha val="75000"/>
+            </a:srgbClr>
           </a:solidFill>
           <a:ln>
             <a:solidFill>
@@ -4137,9 +4137,9 @@
             <a:avLst/>
           </a:prstGeom>
           <a:solidFill>
-            <a:schemeClr val="accent6">
-              <a:alpha val="20000"/>
-            </a:schemeClr>
+            <a:srgbClr val="FFC000">
+              <a:alpha val="50000"/>
+            </a:srgbClr>
           </a:solidFill>
           <a:ln>
             <a:solidFill>
@@ -4279,8 +4279,12 @@
           <a:lstStyle/>
           <a:p>
             <a:r>
+              <a:rPr lang="sl-SI" sz="1300" dirty="0"/>
+              <a:t>main</a:t>
+            </a:r>
+            <a:r>
               <a:rPr lang="en-US" sz="1300" dirty="0"/>
-              <a:t>velocity axis direction</a:t>
+              <a:t> axis direction</a:t>
             </a:r>
             <a:endParaRPr lang="LID4096" sz="1300" dirty="0"/>
           </a:p>

</xml_diff>

<commit_message>
ERK fixed inverse colors bug
</commit_message>
<xml_diff>
--- a/Articles/ERK/schemes.pptx
+++ b/Articles/ERK/schemes.pptx
@@ -3585,9 +3585,7 @@
             <a:avLst/>
           </a:prstGeom>
           <a:solidFill>
-            <a:srgbClr val="4472C4">
-              <a:alpha val="50000"/>
-            </a:srgbClr>
+            <a:srgbClr val="FFDF7F"/>
           </a:solidFill>
           <a:ln>
             <a:solidFill>
@@ -3677,9 +3675,7 @@
             <a:avLst/>
           </a:prstGeom>
           <a:solidFill>
-            <a:srgbClr val="235888">
-              <a:alpha val="50000"/>
-            </a:srgbClr>
+            <a:srgbClr val="FFCA82"/>
           </a:solidFill>
           <a:ln>
             <a:solidFill>
@@ -3769,9 +3765,7 @@
             <a:avLst/>
           </a:prstGeom>
           <a:solidFill>
-            <a:srgbClr val="2C70AE">
-              <a:alpha val="75000"/>
-            </a:srgbClr>
+            <a:srgbClr val="EFC7A6"/>
           </a:solidFill>
           <a:ln>
             <a:solidFill>
@@ -3861,9 +3855,7 @@
             <a:avLst/>
           </a:prstGeom>
           <a:solidFill>
-            <a:srgbClr val="BA7741">
-              <a:alpha val="50000"/>
-            </a:srgbClr>
+            <a:srgbClr val="DCBBA0"/>
           </a:solidFill>
           <a:ln>
             <a:solidFill>
@@ -3953,9 +3945,7 @@
             <a:avLst/>
           </a:prstGeom>
           <a:solidFill>
-            <a:srgbClr val="E08F4E">
-              <a:alpha val="50000"/>
-            </a:srgbClr>
+            <a:srgbClr val="6194C2"/>
           </a:solidFill>
           <a:ln>
             <a:solidFill>
@@ -4045,9 +4035,7 @@
             <a:avLst/>
           </a:prstGeom>
           <a:solidFill>
-            <a:srgbClr val="FFB858">
-              <a:alpha val="75000"/>
-            </a:srgbClr>
+            <a:srgbClr val="91ABC3"/>
           </a:solidFill>
           <a:ln>
             <a:solidFill>
@@ -4137,9 +4125,7 @@
             <a:avLst/>
           </a:prstGeom>
           <a:solidFill>
-            <a:srgbClr val="FFC000">
-              <a:alpha val="50000"/>
-            </a:srgbClr>
+            <a:srgbClr val="A1B8E1"/>
           </a:solidFill>
           <a:ln>
             <a:solidFill>

</xml_diff>